<commit_message>
Post Moon Meeting (Tuesday Morning)
</commit_message>
<xml_diff>
--- a/presentation/Poster_Presentation.pptx
+++ b/presentation/Poster_Presentation.pptx
@@ -6132,7 +6132,7 @@
         </p:blipFill>
         <p:spPr>
           <a:xfrm>
-            <a:off x="24959822" y="10822806"/>
+            <a:off x="25029194" y="11055746"/>
             <a:ext cx="5621749" cy="2262832"/>
           </a:xfrm>
           <a:prstGeom prst="rect">
@@ -6190,7 +6190,7 @@
         </p:blipFill>
         <p:spPr>
           <a:xfrm>
-            <a:off x="24980006" y="11836059"/>
+            <a:off x="25029194" y="10669852"/>
             <a:ext cx="6375793" cy="431911"/>
           </a:xfrm>
           <a:prstGeom prst="rect">
@@ -8427,7 +8427,7 @@
             <p:spPr>
               <a:xfrm>
                 <a:off x="17536766" y="36007072"/>
-                <a:ext cx="16459200" cy="1405769"/>
+                <a:ext cx="14379798" cy="1405769"/>
               </a:xfrm>
               <a:prstGeom prst="rect">
                 <a:avLst/>
@@ -8447,7 +8447,7 @@
                 </a:pPr>
                 <a:r>
                   <a:rPr lang="en-US" sz="3000" b="1" dirty="0"/>
-                  <a:t>Simulate determining </a:t>
+                  <a:t>Determining </a:t>
                 </a:r>
                 <a14:m>
                   <m:oMath xmlns:m="http://schemas.openxmlformats.org/officeDocument/2006/math">
@@ -8529,18 +8529,7 @@
                 </a:r>
                 <a:r>
                   <a:rPr lang="en-US" sz="3000" dirty="0"/>
-                  <a:t>in logistic regression model. MNAR missingness</a:t>
-                </a:r>
-              </a:p>
-              <a:p>
-                <a:pPr>
-                  <a:lnSpc>
-                    <a:spcPct val="150000"/>
-                  </a:lnSpc>
-                </a:pPr>
-                <a:r>
-                  <a:rPr lang="en-US" sz="3000" dirty="0"/>
-                  <a:t>where </a:t>
+                  <a:t>in logistic regression model. MNAR missingness where </a:t>
                 </a:r>
                 <a:r>
                   <a:rPr lang="en-US" sz="3000" i="1" dirty="0"/>
@@ -8580,7 +8569,7 @@
             <p:spPr>
               <a:xfrm>
                 <a:off x="17536766" y="36007072"/>
-                <a:ext cx="16459200" cy="1405769"/>
+                <a:ext cx="14379798" cy="1405769"/>
               </a:xfrm>
               <a:prstGeom prst="rect">
                 <a:avLst/>
@@ -8588,7 +8577,7 @@
               <a:blipFill>
                 <a:blip r:embed="rId25"/>
                 <a:stretch>
-                  <a:fillRect l="-848" b="-13514"/>
+                  <a:fillRect l="-970" b="-13514"/>
                 </a:stretch>
               </a:blipFill>
             </p:spPr>
@@ -9525,7 +9514,7 @@
           <p:nvPr>
             <p:extLst>
               <p:ext uri="{D42A27DB-BD31-4B8C-83A1-F6EECF244321}">
-                <p14:modId xmlns:p14="http://schemas.microsoft.com/office/powerpoint/2010/main" val="360216574"/>
+                <p14:modId xmlns:p14="http://schemas.microsoft.com/office/powerpoint/2010/main" val="1889416194"/>
               </p:ext>
             </p:extLst>
           </p:nvPr>
@@ -9598,7 +9587,7 @@
                     <a:p>
                       <a:r>
                         <a:rPr lang="en-US" sz="2400" dirty="0"/>
-                        <a:t>Listwise Del (s)</a:t>
+                        <a:t>Listwise Del runtime (s)</a:t>
                       </a:r>
                     </a:p>
                   </a:txBody>
@@ -10189,6 +10178,14 @@
               <a:buFont typeface="Arial" panose="020B0604020202020204" pitchFamily="34" charset="0"/>
               <a:buChar char="•"/>
             </a:pPr>
+            <a:r>
+              <a:rPr kumimoji="1" lang="en-US" altLang="ja-JP" sz="3600" b="1" dirty="0">
+                <a:latin typeface="Times New Roman" panose="02020603050405020304" pitchFamily="18" charset="0"/>
+                <a:ea typeface="Helvetica Neue" charset="0"/>
+                <a:cs typeface="Times New Roman" panose="02020603050405020304" pitchFamily="18" charset="0"/>
+              </a:rPr>
+              <a:t>Add </a:t>
+            </a:r>
             <a:r>
               <a:rPr kumimoji="1" lang="en-US" altLang="ja-JP" sz="3600" b="1" dirty="0" err="1">
                 <a:latin typeface="Times New Roman" panose="02020603050405020304" pitchFamily="18" charset="0"/>

</xml_diff>

<commit_message>
Progress on Poster Version 2
Just need to finish up last tasks, conclusion, final formatting
</commit_message>
<xml_diff>
--- a/presentation/Poster_Presentation.pptx
+++ b/presentation/Poster_Presentation.pptx
@@ -17844,7 +17844,7 @@
         </p:nvSpPr>
         <p:spPr>
           <a:xfrm>
-            <a:off x="22718427" y="11506759"/>
+            <a:off x="22718427" y="14101641"/>
             <a:ext cx="3158237" cy="830997"/>
           </a:xfrm>
           <a:prstGeom prst="rect">
@@ -17879,7 +17879,7 @@
         </p:nvSpPr>
         <p:spPr>
           <a:xfrm>
-            <a:off x="23480078" y="12847919"/>
+            <a:off x="23480078" y="14713619"/>
             <a:ext cx="4793172" cy="830997"/>
           </a:xfrm>
           <a:prstGeom prst="rect">
@@ -18255,7 +18255,7 @@
         <p:spPr>
           <a:xfrm>
             <a:off x="22454411" y="2341911"/>
-            <a:ext cx="10048904" cy="461665"/>
+            <a:ext cx="10048904" cy="830997"/>
           </a:xfrm>
           <a:prstGeom prst="rect">
             <a:avLst/>
@@ -18284,9 +18284,22 @@
                 <a:ea typeface="Helvetica Neue" charset="0"/>
                 <a:cs typeface="Helvetica Neue" charset="0"/>
               </a:rPr>
-              <a:t>Investigation 2</a:t>
-            </a:r>
-            <a:endParaRPr kumimoji="1" lang="ja-JP" altLang="en-US" sz="2400" b="1" dirty="0">
+              <a:t>Investigation (2):</a:t>
+            </a:r>
+          </a:p>
+          <a:p>
+            <a:r>
+              <a:rPr kumimoji="1" lang="en-US" altLang="ja-JP" sz="2400" b="1" i="1" dirty="0">
+                <a:solidFill>
+                  <a:schemeClr val="bg1"/>
+                </a:solidFill>
+                <a:latin typeface="Helvetica Neue" charset="0"/>
+                <a:ea typeface="Helvetica Neue" charset="0"/>
+                <a:cs typeface="Helvetica Neue" charset="0"/>
+              </a:rPr>
+              <a:t>When Listwise Deletion Outperforms Multiple Imputation</a:t>
+            </a:r>
+            <a:endParaRPr kumimoji="1" lang="ja-JP" altLang="en-US" sz="2400" b="1" i="1" dirty="0">
               <a:solidFill>
                 <a:schemeClr val="bg1"/>
               </a:solidFill>
@@ -19669,1050 +19682,6 @@
           </p:sp>
         </mc:Fallback>
       </mc:AlternateContent>
-      <p:pic>
-        <p:nvPicPr>
-          <p:cNvPr id="843" name="Picture 842" descr="Graphical user interface, text, application, chat or text message&#10;&#10;Description automatically generated">
-            <a:extLst>
-              <a:ext uri="{FF2B5EF4-FFF2-40B4-BE49-F238E27FC236}">
-                <a16:creationId xmlns:a16="http://schemas.microsoft.com/office/drawing/2014/main" id="{A844ED1F-C030-30C0-1B3D-D4129F011111}"/>
-              </a:ext>
-            </a:extLst>
-          </p:cNvPr>
-          <p:cNvPicPr>
-            <a:picLocks noChangeAspect="1"/>
-          </p:cNvPicPr>
-          <p:nvPr/>
-        </p:nvPicPr>
-        <p:blipFill rotWithShape="1">
-          <a:blip r:embed="rId8"/>
-          <a:srcRect l="-457" t="-577" r="35842" b="2707"/>
-          <a:stretch/>
-        </p:blipFill>
-        <p:spPr>
-          <a:xfrm>
-            <a:off x="23519768" y="6017382"/>
-            <a:ext cx="2580214" cy="1379587"/>
-          </a:xfrm>
-          <a:prstGeom prst="rect">
-            <a:avLst/>
-          </a:prstGeom>
-        </p:spPr>
-      </p:pic>
-      <p:pic>
-        <p:nvPicPr>
-          <p:cNvPr id="844" name="Picture 843" descr="A picture containing logo&#10;&#10;Description automatically generated">
-            <a:extLst>
-              <a:ext uri="{FF2B5EF4-FFF2-40B4-BE49-F238E27FC236}">
-                <a16:creationId xmlns:a16="http://schemas.microsoft.com/office/drawing/2014/main" id="{28DA62CF-4797-4753-CA5F-F9B31F62CC26}"/>
-              </a:ext>
-            </a:extLst>
-          </p:cNvPr>
-          <p:cNvPicPr>
-            <a:picLocks noChangeAspect="1"/>
-          </p:cNvPicPr>
-          <p:nvPr/>
-        </p:nvPicPr>
-        <p:blipFill rotWithShape="1">
-          <a:blip r:embed="rId9"/>
-          <a:srcRect r="39707" b="1110"/>
-          <a:stretch/>
-        </p:blipFill>
-        <p:spPr>
-          <a:xfrm>
-            <a:off x="23510954" y="5350417"/>
-            <a:ext cx="2561470" cy="757274"/>
-          </a:xfrm>
-          <a:prstGeom prst="rect">
-            <a:avLst/>
-          </a:prstGeom>
-        </p:spPr>
-      </p:pic>
-      <p:pic>
-        <p:nvPicPr>
-          <p:cNvPr id="845" name="Picture 844" descr="A picture containing graphical user interface&#10;&#10;Description automatically generated">
-            <a:extLst>
-              <a:ext uri="{FF2B5EF4-FFF2-40B4-BE49-F238E27FC236}">
-                <a16:creationId xmlns:a16="http://schemas.microsoft.com/office/drawing/2014/main" id="{0519BF7D-6703-9205-C7B3-58A43B1A401A}"/>
-              </a:ext>
-            </a:extLst>
-          </p:cNvPr>
-          <p:cNvPicPr>
-            <a:picLocks noChangeAspect="1"/>
-          </p:cNvPicPr>
-          <p:nvPr/>
-        </p:nvPicPr>
-        <p:blipFill rotWithShape="1">
-          <a:blip r:embed="rId10"/>
-          <a:srcRect r="47678" b="-494"/>
-          <a:stretch/>
-        </p:blipFill>
-        <p:spPr>
-          <a:xfrm>
-            <a:off x="23519767" y="4794436"/>
-            <a:ext cx="2222809" cy="681334"/>
-          </a:xfrm>
-          <a:prstGeom prst="rect">
-            <a:avLst/>
-          </a:prstGeom>
-        </p:spPr>
-      </p:pic>
-      <p:pic>
-        <p:nvPicPr>
-          <p:cNvPr id="846" name="Picture 845" descr="Text&#10;&#10;Description automatically generated">
-            <a:extLst>
-              <a:ext uri="{FF2B5EF4-FFF2-40B4-BE49-F238E27FC236}">
-                <a16:creationId xmlns:a16="http://schemas.microsoft.com/office/drawing/2014/main" id="{AA278546-AEC3-B2CF-632E-AE0C472B3616}"/>
-              </a:ext>
-            </a:extLst>
-          </p:cNvPr>
-          <p:cNvPicPr>
-            <a:picLocks noChangeAspect="1"/>
-          </p:cNvPicPr>
-          <p:nvPr/>
-        </p:nvPicPr>
-        <p:blipFill rotWithShape="1">
-          <a:blip r:embed="rId11"/>
-          <a:srcRect t="1" r="33869" b="460"/>
-          <a:stretch/>
-        </p:blipFill>
-        <p:spPr>
-          <a:xfrm>
-            <a:off x="23519768" y="4042544"/>
-            <a:ext cx="2574223" cy="869059"/>
-          </a:xfrm>
-          <a:prstGeom prst="rect">
-            <a:avLst/>
-          </a:prstGeom>
-        </p:spPr>
-      </p:pic>
-      <p:pic>
-        <p:nvPicPr>
-          <p:cNvPr id="847" name="Picture 846" descr="Text&#10;&#10;Description automatically generated with medium confidence">
-            <a:extLst>
-              <a:ext uri="{FF2B5EF4-FFF2-40B4-BE49-F238E27FC236}">
-                <a16:creationId xmlns:a16="http://schemas.microsoft.com/office/drawing/2014/main" id="{EBA14750-CA94-DAC3-1B69-FEB988D23C4F}"/>
-              </a:ext>
-            </a:extLst>
-          </p:cNvPr>
-          <p:cNvPicPr>
-            <a:picLocks noChangeAspect="1"/>
-          </p:cNvPicPr>
-          <p:nvPr/>
-        </p:nvPicPr>
-        <p:blipFill rotWithShape="1">
-          <a:blip r:embed="rId12"/>
-          <a:srcRect r="48588" b="1014"/>
-          <a:stretch/>
-        </p:blipFill>
-        <p:spPr>
-          <a:xfrm>
-            <a:off x="26289738" y="5197102"/>
-            <a:ext cx="2159078" cy="869059"/>
-          </a:xfrm>
-          <a:prstGeom prst="rect">
-            <a:avLst/>
-          </a:prstGeom>
-        </p:spPr>
-      </p:pic>
-      <p:pic>
-        <p:nvPicPr>
-          <p:cNvPr id="848" name="Picture 847" descr="Text&#10;&#10;Description automatically generated">
-            <a:extLst>
-              <a:ext uri="{FF2B5EF4-FFF2-40B4-BE49-F238E27FC236}">
-                <a16:creationId xmlns:a16="http://schemas.microsoft.com/office/drawing/2014/main" id="{F3EA541B-65D9-4BB8-248C-5F4B44BE2242}"/>
-              </a:ext>
-            </a:extLst>
-          </p:cNvPr>
-          <p:cNvPicPr>
-            <a:picLocks noChangeAspect="1"/>
-          </p:cNvPicPr>
-          <p:nvPr/>
-        </p:nvPicPr>
-        <p:blipFill rotWithShape="1">
-          <a:blip r:embed="rId13"/>
-          <a:srcRect r="18638" b="3007"/>
-          <a:stretch/>
-        </p:blipFill>
-        <p:spPr>
-          <a:xfrm>
-            <a:off x="26263723" y="6085341"/>
-            <a:ext cx="2580213" cy="1302246"/>
-          </a:xfrm>
-          <a:prstGeom prst="rect">
-            <a:avLst/>
-          </a:prstGeom>
-        </p:spPr>
-      </p:pic>
-      <p:pic>
-        <p:nvPicPr>
-          <p:cNvPr id="849" name="Picture 848">
-            <a:extLst>
-              <a:ext uri="{FF2B5EF4-FFF2-40B4-BE49-F238E27FC236}">
-                <a16:creationId xmlns:a16="http://schemas.microsoft.com/office/drawing/2014/main" id="{0D110C46-97EB-7E4D-DFAF-E0ADB195FB94}"/>
-              </a:ext>
-            </a:extLst>
-          </p:cNvPr>
-          <p:cNvPicPr>
-            <a:picLocks noChangeAspect="1"/>
-          </p:cNvPicPr>
-          <p:nvPr/>
-        </p:nvPicPr>
-        <p:blipFill rotWithShape="1">
-          <a:blip r:embed="rId14"/>
-          <a:srcRect t="-9705" r="42362" b="-1"/>
-          <a:stretch/>
-        </p:blipFill>
-        <p:spPr>
-          <a:xfrm>
-            <a:off x="26289738" y="5068977"/>
-            <a:ext cx="2448670" cy="165879"/>
-          </a:xfrm>
-          <a:prstGeom prst="rect">
-            <a:avLst/>
-          </a:prstGeom>
-        </p:spPr>
-      </p:pic>
-      <p:sp>
-        <p:nvSpPr>
-          <p:cNvPr id="850" name="正方形/長方形 17">
-            <a:extLst>
-              <a:ext uri="{FF2B5EF4-FFF2-40B4-BE49-F238E27FC236}">
-                <a16:creationId xmlns:a16="http://schemas.microsoft.com/office/drawing/2014/main" id="{BB35B240-CE9E-297E-EA83-72509E66AECE}"/>
-              </a:ext>
-            </a:extLst>
-          </p:cNvPr>
-          <p:cNvSpPr/>
-          <p:nvPr/>
-        </p:nvSpPr>
-        <p:spPr>
-          <a:xfrm>
-            <a:off x="23480078" y="3889504"/>
-            <a:ext cx="2661496" cy="3585312"/>
-          </a:xfrm>
-          <a:prstGeom prst="rect">
-            <a:avLst/>
-          </a:prstGeom>
-          <a:noFill/>
-          <a:ln w="34925">
-            <a:solidFill>
-              <a:schemeClr val="accent2"/>
-            </a:solidFill>
-          </a:ln>
-        </p:spPr>
-        <p:style>
-          <a:lnRef idx="2">
-            <a:schemeClr val="accent1">
-              <a:shade val="50000"/>
-            </a:schemeClr>
-          </a:lnRef>
-          <a:fillRef idx="1">
-            <a:schemeClr val="accent1"/>
-          </a:fillRef>
-          <a:effectRef idx="0">
-            <a:schemeClr val="accent1"/>
-          </a:effectRef>
-          <a:fontRef idx="minor">
-            <a:schemeClr val="lt1"/>
-          </a:fontRef>
-        </p:style>
-        <p:txBody>
-          <a:bodyPr rtlCol="0" anchor="ctr"/>
-          <a:lstStyle/>
-          <a:p>
-            <a:pPr algn="ctr"/>
-            <a:endParaRPr kumimoji="1" lang="ja-JP" altLang="en-US" sz="675"/>
-          </a:p>
-        </p:txBody>
-      </p:sp>
-      <p:sp>
-        <p:nvSpPr>
-          <p:cNvPr id="851" name="正方形/長方形 17">
-            <a:extLst>
-              <a:ext uri="{FF2B5EF4-FFF2-40B4-BE49-F238E27FC236}">
-                <a16:creationId xmlns:a16="http://schemas.microsoft.com/office/drawing/2014/main" id="{1412A99F-5006-7166-46EE-EFD8F59CF1A9}"/>
-              </a:ext>
-            </a:extLst>
-          </p:cNvPr>
-          <p:cNvSpPr/>
-          <p:nvPr/>
-        </p:nvSpPr>
-        <p:spPr>
-          <a:xfrm>
-            <a:off x="26186644" y="3884581"/>
-            <a:ext cx="2661496" cy="3585312"/>
-          </a:xfrm>
-          <a:prstGeom prst="rect">
-            <a:avLst/>
-          </a:prstGeom>
-          <a:noFill/>
-          <a:ln w="34925">
-            <a:solidFill>
-              <a:schemeClr val="accent2"/>
-            </a:solidFill>
-          </a:ln>
-        </p:spPr>
-        <p:style>
-          <a:lnRef idx="2">
-            <a:schemeClr val="accent1">
-              <a:shade val="50000"/>
-            </a:schemeClr>
-          </a:lnRef>
-          <a:fillRef idx="1">
-            <a:schemeClr val="accent1"/>
-          </a:fillRef>
-          <a:effectRef idx="0">
-            <a:schemeClr val="accent1"/>
-          </a:effectRef>
-          <a:fontRef idx="minor">
-            <a:schemeClr val="lt1"/>
-          </a:fontRef>
-        </p:style>
-        <p:txBody>
-          <a:bodyPr rtlCol="0" anchor="ctr"/>
-          <a:lstStyle/>
-          <a:p>
-            <a:pPr algn="ctr"/>
-            <a:endParaRPr kumimoji="1" lang="ja-JP" altLang="en-US" sz="675"/>
-          </a:p>
-        </p:txBody>
-      </p:sp>
-      <p:graphicFrame>
-        <p:nvGraphicFramePr>
-          <p:cNvPr id="852" name="Table 2">
-            <a:extLst>
-              <a:ext uri="{FF2B5EF4-FFF2-40B4-BE49-F238E27FC236}">
-                <a16:creationId xmlns:a16="http://schemas.microsoft.com/office/drawing/2014/main" id="{FBEDA757-8B7B-5AFE-32A6-7911EC3B7182}"/>
-              </a:ext>
-            </a:extLst>
-          </p:cNvPr>
-          <p:cNvGraphicFramePr>
-            <a:graphicFrameLocks/>
-          </p:cNvGraphicFramePr>
-          <p:nvPr>
-            <p:extLst>
-              <p:ext uri="{D42A27DB-BD31-4B8C-83A1-F6EECF244321}">
-                <p14:modId xmlns:p14="http://schemas.microsoft.com/office/powerpoint/2010/main" val="3256650668"/>
-              </p:ext>
-            </p:extLst>
-          </p:nvPr>
-        </p:nvGraphicFramePr>
-        <p:xfrm>
-          <a:off x="23905078" y="7512373"/>
-          <a:ext cx="4463070" cy="1516220"/>
-        </p:xfrm>
-        <a:graphic>
-          <a:graphicData uri="http://schemas.openxmlformats.org/drawingml/2006/table">
-            <a:tbl>
-              <a:tblPr firstRow="1" bandRow="1">
-                <a:tableStyleId>{5C22544A-7EE6-4342-B048-85BDC9FD1C3A}</a:tableStyleId>
-              </a:tblPr>
-              <a:tblGrid>
-                <a:gridCol w="892614">
-                  <a:extLst>
-                    <a:ext uri="{9D8B030D-6E8A-4147-A177-3AD203B41FA5}">
-                      <a16:colId xmlns:a16="http://schemas.microsoft.com/office/drawing/2014/main" val="2639204986"/>
-                    </a:ext>
-                  </a:extLst>
-                </a:gridCol>
-                <a:gridCol w="892614">
-                  <a:extLst>
-                    <a:ext uri="{9D8B030D-6E8A-4147-A177-3AD203B41FA5}">
-                      <a16:colId xmlns:a16="http://schemas.microsoft.com/office/drawing/2014/main" val="2690891796"/>
-                    </a:ext>
-                  </a:extLst>
-                </a:gridCol>
-                <a:gridCol w="892614">
-                  <a:extLst>
-                    <a:ext uri="{9D8B030D-6E8A-4147-A177-3AD203B41FA5}">
-                      <a16:colId xmlns:a16="http://schemas.microsoft.com/office/drawing/2014/main" val="3723378948"/>
-                    </a:ext>
-                  </a:extLst>
-                </a:gridCol>
-                <a:gridCol w="892614">
-                  <a:extLst>
-                    <a:ext uri="{9D8B030D-6E8A-4147-A177-3AD203B41FA5}">
-                      <a16:colId xmlns:a16="http://schemas.microsoft.com/office/drawing/2014/main" val="1498371569"/>
-                    </a:ext>
-                  </a:extLst>
-                </a:gridCol>
-                <a:gridCol w="892614">
-                  <a:extLst>
-                    <a:ext uri="{9D8B030D-6E8A-4147-A177-3AD203B41FA5}">
-                      <a16:colId xmlns:a16="http://schemas.microsoft.com/office/drawing/2014/main" val="889807820"/>
-                    </a:ext>
-                  </a:extLst>
-                </a:gridCol>
-              </a:tblGrid>
-              <a:tr h="175591">
-                <a:tc>
-                  <a:txBody>
-                    <a:bodyPr/>
-                    <a:lstStyle/>
-                    <a:p>
-                      <a:endParaRPr lang="en-US" sz="900" dirty="0"/>
-                    </a:p>
-                  </a:txBody>
-                  <a:tcPr marL="34290" marR="34290" marT="17145" marB="17145">
-                    <a:lnTlToBr w="12700" cap="flat" cmpd="sng" algn="ctr">
-                      <a:solidFill>
-                        <a:schemeClr val="tx1"/>
-                      </a:solidFill>
-                      <a:prstDash val="solid"/>
-                      <a:round/>
-                      <a:headEnd type="none" w="med" len="med"/>
-                      <a:tailEnd type="none" w="med" len="med"/>
-                    </a:lnTlToBr>
-                    <a:solidFill>
-                      <a:schemeClr val="tx2"/>
-                    </a:solidFill>
-                  </a:tcPr>
-                </a:tc>
-                <a:tc>
-                  <a:txBody>
-                    <a:bodyPr/>
-                    <a:lstStyle/>
-                    <a:p>
-                      <a:r>
-                        <a:rPr lang="en-US" sz="900" dirty="0"/>
-                        <a:t>Estimate</a:t>
-                      </a:r>
-                    </a:p>
-                  </a:txBody>
-                  <a:tcPr marL="34290" marR="34290" marT="17145" marB="17145"/>
-                </a:tc>
-                <a:tc>
-                  <a:txBody>
-                    <a:bodyPr/>
-                    <a:lstStyle/>
-                    <a:p>
-                      <a:r>
-                        <a:rPr lang="en-US" sz="900" dirty="0"/>
-                        <a:t>PB</a:t>
-                      </a:r>
-                    </a:p>
-                  </a:txBody>
-                  <a:tcPr marL="34290" marR="34290" marT="17145" marB="17145"/>
-                </a:tc>
-                <a:tc>
-                  <a:txBody>
-                    <a:bodyPr/>
-                    <a:lstStyle/>
-                    <a:p>
-                      <a:r>
-                        <a:rPr lang="en-US" sz="900" dirty="0"/>
-                        <a:t>CR</a:t>
-                      </a:r>
-                    </a:p>
-                  </a:txBody>
-                  <a:tcPr marL="34290" marR="34290" marT="17145" marB="17145"/>
-                </a:tc>
-                <a:tc>
-                  <a:txBody>
-                    <a:bodyPr/>
-                    <a:lstStyle/>
-                    <a:p>
-                      <a:r>
-                        <a:rPr lang="en-US" sz="900" dirty="0"/>
-                        <a:t>AW</a:t>
-                      </a:r>
-                    </a:p>
-                  </a:txBody>
-                  <a:tcPr marL="34290" marR="34290" marT="17145" marB="17145"/>
-                </a:tc>
-                <a:extLst>
-                  <a:ext uri="{0D108BD9-81ED-4DB2-BD59-A6C34878D82A}">
-                    <a16:rowId xmlns:a16="http://schemas.microsoft.com/office/drawing/2014/main" val="1025636070"/>
-                  </a:ext>
-                </a:extLst>
-              </a:tr>
-              <a:tr h="175591">
-                <a:tc>
-                  <a:txBody>
-                    <a:bodyPr/>
-                    <a:lstStyle/>
-                    <a:p>
-                      <a:r>
-                        <a:rPr lang="en-US" sz="900" dirty="0"/>
-                        <a:t>MCAR</a:t>
-                      </a:r>
-                    </a:p>
-                  </a:txBody>
-                  <a:tcPr marL="34290" marR="34290" marT="17145" marB="17145">
-                    <a:solidFill>
-                      <a:schemeClr val="accent2"/>
-                    </a:solidFill>
-                  </a:tcPr>
-                </a:tc>
-                <a:tc>
-                  <a:txBody>
-                    <a:bodyPr/>
-                    <a:lstStyle/>
-                    <a:p>
-                      <a:r>
-                        <a:rPr lang="en-US" sz="900" dirty="0"/>
-                        <a:t>0.9779</a:t>
-                      </a:r>
-                    </a:p>
-                  </a:txBody>
-                  <a:tcPr marL="34290" marR="34290" marT="17145" marB="17145"/>
-                </a:tc>
-                <a:tc>
-                  <a:txBody>
-                    <a:bodyPr/>
-                    <a:lstStyle/>
-                    <a:p>
-                      <a:r>
-                        <a:rPr lang="en-US" sz="900" dirty="0"/>
-                        <a:t>2.209</a:t>
-                      </a:r>
-                    </a:p>
-                  </a:txBody>
-                  <a:tcPr marL="34290" marR="34290" marT="17145" marB="17145"/>
-                </a:tc>
-                <a:tc>
-                  <a:txBody>
-                    <a:bodyPr/>
-                    <a:lstStyle/>
-                    <a:p>
-                      <a:r>
-                        <a:rPr lang="en-US" sz="900" dirty="0"/>
-                        <a:t>0.97</a:t>
-                      </a:r>
-                    </a:p>
-                  </a:txBody>
-                  <a:tcPr marL="34290" marR="34290" marT="17145" marB="17145"/>
-                </a:tc>
-                <a:tc>
-                  <a:txBody>
-                    <a:bodyPr/>
-                    <a:lstStyle/>
-                    <a:p>
-                      <a:r>
-                        <a:rPr lang="en-US" sz="900" dirty="0"/>
-                        <a:t>0.102</a:t>
-                      </a:r>
-                    </a:p>
-                  </a:txBody>
-                  <a:tcPr marL="34290" marR="34290" marT="17145" marB="17145"/>
-                </a:tc>
-                <a:extLst>
-                  <a:ext uri="{0D108BD9-81ED-4DB2-BD59-A6C34878D82A}">
-                    <a16:rowId xmlns:a16="http://schemas.microsoft.com/office/drawing/2014/main" val="2450062889"/>
-                  </a:ext>
-                </a:extLst>
-              </a:tr>
-              <a:tr h="175591">
-                <a:tc>
-                  <a:txBody>
-                    <a:bodyPr/>
-                    <a:lstStyle/>
-                    <a:p>
-                      <a:r>
-                        <a:rPr lang="en-US" sz="900" dirty="0"/>
-                        <a:t>MAR-light</a:t>
-                      </a:r>
-                    </a:p>
-                  </a:txBody>
-                  <a:tcPr marL="34290" marR="34290" marT="17145" marB="17145">
-                    <a:solidFill>
-                      <a:schemeClr val="accent2"/>
-                    </a:solidFill>
-                  </a:tcPr>
-                </a:tc>
-                <a:tc>
-                  <a:txBody>
-                    <a:bodyPr/>
-                    <a:lstStyle/>
-                    <a:p>
-                      <a:r>
-                        <a:rPr lang="en-US" sz="900" dirty="0"/>
-                        <a:t>0.9768</a:t>
-                      </a:r>
-                    </a:p>
-                  </a:txBody>
-                  <a:tcPr marL="34290" marR="34290" marT="17145" marB="17145"/>
-                </a:tc>
-                <a:tc>
-                  <a:txBody>
-                    <a:bodyPr/>
-                    <a:lstStyle/>
-                    <a:p>
-                      <a:r>
-                        <a:rPr lang="en-US" sz="900" dirty="0"/>
-                        <a:t>2.315</a:t>
-                      </a:r>
-                    </a:p>
-                  </a:txBody>
-                  <a:tcPr marL="34290" marR="34290" marT="17145" marB="17145"/>
-                </a:tc>
-                <a:tc>
-                  <a:txBody>
-                    <a:bodyPr/>
-                    <a:lstStyle/>
-                    <a:p>
-                      <a:r>
-                        <a:rPr lang="en-US" sz="900" dirty="0"/>
-                        <a:t>0.91</a:t>
-                      </a:r>
-                    </a:p>
-                  </a:txBody>
-                  <a:tcPr marL="34290" marR="34290" marT="17145" marB="17145"/>
-                </a:tc>
-                <a:tc>
-                  <a:txBody>
-                    <a:bodyPr/>
-                    <a:lstStyle/>
-                    <a:p>
-                      <a:r>
-                        <a:rPr lang="en-US" sz="900" dirty="0"/>
-                        <a:t>0.108</a:t>
-                      </a:r>
-                    </a:p>
-                  </a:txBody>
-                  <a:tcPr marL="34290" marR="34290" marT="17145" marB="17145"/>
-                </a:tc>
-                <a:extLst>
-                  <a:ext uri="{0D108BD9-81ED-4DB2-BD59-A6C34878D82A}">
-                    <a16:rowId xmlns:a16="http://schemas.microsoft.com/office/drawing/2014/main" val="106183214"/>
-                  </a:ext>
-                </a:extLst>
-              </a:tr>
-              <a:tr h="231337">
-                <a:tc>
-                  <a:txBody>
-                    <a:bodyPr/>
-                    <a:lstStyle/>
-                    <a:p>
-                      <a:r>
-                        <a:rPr lang="en-US" sz="900" dirty="0"/>
-                        <a:t>MAR-moderate</a:t>
-                      </a:r>
-                    </a:p>
-                  </a:txBody>
-                  <a:tcPr marL="34290" marR="34290" marT="17145" marB="17145">
-                    <a:solidFill>
-                      <a:schemeClr val="accent2"/>
-                    </a:solidFill>
-                  </a:tcPr>
-                </a:tc>
-                <a:tc>
-                  <a:txBody>
-                    <a:bodyPr/>
-                    <a:lstStyle/>
-                    <a:p>
-                      <a:r>
-                        <a:rPr lang="en-US" sz="900" dirty="0"/>
-                        <a:t>0.9799</a:t>
-                      </a:r>
-                    </a:p>
-                  </a:txBody>
-                  <a:tcPr marL="34290" marR="34290" marT="17145" marB="17145"/>
-                </a:tc>
-                <a:tc>
-                  <a:txBody>
-                    <a:bodyPr/>
-                    <a:lstStyle/>
-                    <a:p>
-                      <a:r>
-                        <a:rPr lang="en-US" sz="900" dirty="0"/>
-                        <a:t>2.011</a:t>
-                      </a:r>
-                    </a:p>
-                  </a:txBody>
-                  <a:tcPr marL="34290" marR="34290" marT="17145" marB="17145"/>
-                </a:tc>
-                <a:tc>
-                  <a:txBody>
-                    <a:bodyPr/>
-                    <a:lstStyle/>
-                    <a:p>
-                      <a:r>
-                        <a:rPr lang="en-US" sz="900" dirty="0"/>
-                        <a:t>0.91</a:t>
-                      </a:r>
-                    </a:p>
-                  </a:txBody>
-                  <a:tcPr marL="34290" marR="34290" marT="17145" marB="17145"/>
-                </a:tc>
-                <a:tc>
-                  <a:txBody>
-                    <a:bodyPr/>
-                    <a:lstStyle/>
-                    <a:p>
-                      <a:r>
-                        <a:rPr lang="en-US" sz="900" dirty="0"/>
-                        <a:t>0.095</a:t>
-                      </a:r>
-                    </a:p>
-                  </a:txBody>
-                  <a:tcPr marL="34290" marR="34290" marT="17145" marB="17145"/>
-                </a:tc>
-                <a:extLst>
-                  <a:ext uri="{0D108BD9-81ED-4DB2-BD59-A6C34878D82A}">
-                    <a16:rowId xmlns:a16="http://schemas.microsoft.com/office/drawing/2014/main" val="2167119470"/>
-                  </a:ext>
-                </a:extLst>
-              </a:tr>
-              <a:tr h="175591">
-                <a:tc>
-                  <a:txBody>
-                    <a:bodyPr/>
-                    <a:lstStyle/>
-                    <a:p>
-                      <a:r>
-                        <a:rPr lang="en-US" sz="900" dirty="0"/>
-                        <a:t>MAR-heavy</a:t>
-                      </a:r>
-                    </a:p>
-                  </a:txBody>
-                  <a:tcPr marL="34290" marR="34290" marT="17145" marB="17145">
-                    <a:solidFill>
-                      <a:schemeClr val="accent2"/>
-                    </a:solidFill>
-                  </a:tcPr>
-                </a:tc>
-                <a:tc>
-                  <a:txBody>
-                    <a:bodyPr/>
-                    <a:lstStyle/>
-                    <a:p>
-                      <a:r>
-                        <a:rPr lang="en-US" sz="900" dirty="0"/>
-                        <a:t>0.9841</a:t>
-                      </a:r>
-                    </a:p>
-                  </a:txBody>
-                  <a:tcPr marL="34290" marR="34290" marT="17145" marB="17145"/>
-                </a:tc>
-                <a:tc>
-                  <a:txBody>
-                    <a:bodyPr/>
-                    <a:lstStyle/>
-                    <a:p>
-                      <a:r>
-                        <a:rPr lang="en-US" sz="900" dirty="0"/>
-                        <a:t>1.588</a:t>
-                      </a:r>
-                    </a:p>
-                  </a:txBody>
-                  <a:tcPr marL="34290" marR="34290" marT="17145" marB="17145"/>
-                </a:tc>
-                <a:tc>
-                  <a:txBody>
-                    <a:bodyPr/>
-                    <a:lstStyle/>
-                    <a:p>
-                      <a:r>
-                        <a:rPr lang="en-US" sz="900" dirty="0"/>
-                        <a:t>0.90</a:t>
-                      </a:r>
-                    </a:p>
-                  </a:txBody>
-                  <a:tcPr marL="34290" marR="34290" marT="17145" marB="17145"/>
-                </a:tc>
-                <a:tc>
-                  <a:txBody>
-                    <a:bodyPr/>
-                    <a:lstStyle/>
-                    <a:p>
-                      <a:r>
-                        <a:rPr lang="en-US" sz="900" dirty="0"/>
-                        <a:t>0.082</a:t>
-                      </a:r>
-                    </a:p>
-                  </a:txBody>
-                  <a:tcPr marL="34290" marR="34290" marT="17145" marB="17145"/>
-                </a:tc>
-                <a:extLst>
-                  <a:ext uri="{0D108BD9-81ED-4DB2-BD59-A6C34878D82A}">
-                    <a16:rowId xmlns:a16="http://schemas.microsoft.com/office/drawing/2014/main" val="4197118472"/>
-                  </a:ext>
-                </a:extLst>
-              </a:tr>
-              <a:tr h="175591">
-                <a:tc>
-                  <a:txBody>
-                    <a:bodyPr/>
-                    <a:lstStyle/>
-                    <a:p>
-                      <a:r>
-                        <a:rPr lang="en-US" sz="900" dirty="0"/>
-                        <a:t>MNAR-light</a:t>
-                      </a:r>
-                    </a:p>
-                  </a:txBody>
-                  <a:tcPr marL="34290" marR="34290" marT="17145" marB="17145">
-                    <a:solidFill>
-                      <a:schemeClr val="accent2"/>
-                    </a:solidFill>
-                  </a:tcPr>
-                </a:tc>
-                <a:tc>
-                  <a:txBody>
-                    <a:bodyPr/>
-                    <a:lstStyle/>
-                    <a:p>
-                      <a:r>
-                        <a:rPr lang="en-US" sz="900" dirty="0"/>
-                        <a:t>1.0174</a:t>
-                      </a:r>
-                    </a:p>
-                  </a:txBody>
-                  <a:tcPr marL="34290" marR="34290" marT="17145" marB="17145"/>
-                </a:tc>
-                <a:tc>
-                  <a:txBody>
-                    <a:bodyPr/>
-                    <a:lstStyle/>
-                    <a:p>
-                      <a:r>
-                        <a:rPr lang="en-US" sz="900" dirty="0"/>
-                        <a:t>1.740</a:t>
-                      </a:r>
-                    </a:p>
-                  </a:txBody>
-                  <a:tcPr marL="34290" marR="34290" marT="17145" marB="17145"/>
-                </a:tc>
-                <a:tc>
-                  <a:txBody>
-                    <a:bodyPr/>
-                    <a:lstStyle/>
-                    <a:p>
-                      <a:r>
-                        <a:rPr lang="en-US" sz="900" dirty="0"/>
-                        <a:t>0.96</a:t>
-                      </a:r>
-                    </a:p>
-                  </a:txBody>
-                  <a:tcPr marL="34290" marR="34290" marT="17145" marB="17145"/>
-                </a:tc>
-                <a:tc>
-                  <a:txBody>
-                    <a:bodyPr/>
-                    <a:lstStyle/>
-                    <a:p>
-                      <a:r>
-                        <a:rPr lang="en-US" sz="900" dirty="0"/>
-                        <a:t>0.306</a:t>
-                      </a:r>
-                    </a:p>
-                  </a:txBody>
-                  <a:tcPr marL="34290" marR="34290" marT="17145" marB="17145"/>
-                </a:tc>
-                <a:extLst>
-                  <a:ext uri="{0D108BD9-81ED-4DB2-BD59-A6C34878D82A}">
-                    <a16:rowId xmlns:a16="http://schemas.microsoft.com/office/drawing/2014/main" val="4122388607"/>
-                  </a:ext>
-                </a:extLst>
-              </a:tr>
-              <a:tr h="231337">
-                <a:tc>
-                  <a:txBody>
-                    <a:bodyPr/>
-                    <a:lstStyle/>
-                    <a:p>
-                      <a:r>
-                        <a:rPr lang="en-US" sz="900" dirty="0"/>
-                        <a:t>MNAR-moderate</a:t>
-                      </a:r>
-                    </a:p>
-                  </a:txBody>
-                  <a:tcPr marL="34290" marR="34290" marT="17145" marB="17145">
-                    <a:solidFill>
-                      <a:schemeClr val="accent2"/>
-                    </a:solidFill>
-                  </a:tcPr>
-                </a:tc>
-                <a:tc>
-                  <a:txBody>
-                    <a:bodyPr/>
-                    <a:lstStyle/>
-                    <a:p>
-                      <a:r>
-                        <a:rPr lang="en-US" sz="900" dirty="0"/>
-                        <a:t>1.0262</a:t>
-                      </a:r>
-                    </a:p>
-                  </a:txBody>
-                  <a:tcPr marL="34290" marR="34290" marT="17145" marB="17145"/>
-                </a:tc>
-                <a:tc>
-                  <a:txBody>
-                    <a:bodyPr/>
-                    <a:lstStyle/>
-                    <a:p>
-                      <a:r>
-                        <a:rPr lang="en-US" sz="900" dirty="0"/>
-                        <a:t>2.615</a:t>
-                      </a:r>
-                    </a:p>
-                  </a:txBody>
-                  <a:tcPr marL="34290" marR="34290" marT="17145" marB="17145"/>
-                </a:tc>
-                <a:tc>
-                  <a:txBody>
-                    <a:bodyPr/>
-                    <a:lstStyle/>
-                    <a:p>
-                      <a:r>
-                        <a:rPr lang="en-US" sz="900" dirty="0"/>
-                        <a:t>0.95</a:t>
-                      </a:r>
-                    </a:p>
-                  </a:txBody>
-                  <a:tcPr marL="34290" marR="34290" marT="17145" marB="17145"/>
-                </a:tc>
-                <a:tc>
-                  <a:txBody>
-                    <a:bodyPr/>
-                    <a:lstStyle/>
-                    <a:p>
-                      <a:r>
-                        <a:rPr lang="en-US" sz="900" dirty="0"/>
-                        <a:t>0.331</a:t>
-                      </a:r>
-                    </a:p>
-                  </a:txBody>
-                  <a:tcPr marL="34290" marR="34290" marT="17145" marB="17145"/>
-                </a:tc>
-                <a:extLst>
-                  <a:ext uri="{0D108BD9-81ED-4DB2-BD59-A6C34878D82A}">
-                    <a16:rowId xmlns:a16="http://schemas.microsoft.com/office/drawing/2014/main" val="1306177704"/>
-                  </a:ext>
-                </a:extLst>
-              </a:tr>
-              <a:tr h="175591">
-                <a:tc>
-                  <a:txBody>
-                    <a:bodyPr/>
-                    <a:lstStyle/>
-                    <a:p>
-                      <a:r>
-                        <a:rPr lang="en-US" sz="900" dirty="0"/>
-                        <a:t>MNAR-heavy</a:t>
-                      </a:r>
-                    </a:p>
-                  </a:txBody>
-                  <a:tcPr marL="34290" marR="34290" marT="17145" marB="17145">
-                    <a:solidFill>
-                      <a:schemeClr val="accent2"/>
-                    </a:solidFill>
-                  </a:tcPr>
-                </a:tc>
-                <a:tc>
-                  <a:txBody>
-                    <a:bodyPr/>
-                    <a:lstStyle/>
-                    <a:p>
-                      <a:r>
-                        <a:rPr lang="en-US" sz="900" dirty="0"/>
-                        <a:t>1.0485</a:t>
-                      </a:r>
-                    </a:p>
-                  </a:txBody>
-                  <a:tcPr marL="34290" marR="34290" marT="17145" marB="17145"/>
-                </a:tc>
-                <a:tc>
-                  <a:txBody>
-                    <a:bodyPr/>
-                    <a:lstStyle/>
-                    <a:p>
-                      <a:r>
-                        <a:rPr lang="en-US" sz="900" dirty="0"/>
-                        <a:t>4.853</a:t>
-                      </a:r>
-                    </a:p>
-                  </a:txBody>
-                  <a:tcPr marL="34290" marR="34290" marT="17145" marB="17145"/>
-                </a:tc>
-                <a:tc>
-                  <a:txBody>
-                    <a:bodyPr/>
-                    <a:lstStyle/>
-                    <a:p>
-                      <a:r>
-                        <a:rPr lang="en-US" sz="900" dirty="0"/>
-                        <a:t>0.88</a:t>
-                      </a:r>
-                    </a:p>
-                  </a:txBody>
-                  <a:tcPr marL="34290" marR="34290" marT="17145" marB="17145"/>
-                </a:tc>
-                <a:tc>
-                  <a:txBody>
-                    <a:bodyPr/>
-                    <a:lstStyle/>
-                    <a:p>
-                      <a:r>
-                        <a:rPr lang="en-US" sz="900" dirty="0"/>
-                        <a:t>0.388</a:t>
-                      </a:r>
-                    </a:p>
-                  </a:txBody>
-                  <a:tcPr marL="34290" marR="34290" marT="17145" marB="17145"/>
-                </a:tc>
-                <a:extLst>
-                  <a:ext uri="{0D108BD9-81ED-4DB2-BD59-A6C34878D82A}">
-                    <a16:rowId xmlns:a16="http://schemas.microsoft.com/office/drawing/2014/main" val="4228847266"/>
-                  </a:ext>
-                </a:extLst>
-              </a:tr>
-            </a:tbl>
-          </a:graphicData>
-        </a:graphic>
-      </p:graphicFrame>
-      <p:sp>
-        <p:nvSpPr>
-          <p:cNvPr id="853" name="正方形/長方形 17">
-            <a:extLst>
-              <a:ext uri="{FF2B5EF4-FFF2-40B4-BE49-F238E27FC236}">
-                <a16:creationId xmlns:a16="http://schemas.microsoft.com/office/drawing/2014/main" id="{AB984E1A-C050-AE80-0130-21003D6A6EA3}"/>
-              </a:ext>
-            </a:extLst>
-          </p:cNvPr>
-          <p:cNvSpPr/>
-          <p:nvPr/>
-        </p:nvSpPr>
-        <p:spPr>
-          <a:xfrm>
-            <a:off x="23493842" y="7481866"/>
-            <a:ext cx="5355130" cy="1579514"/>
-          </a:xfrm>
-          <a:prstGeom prst="rect">
-            <a:avLst/>
-          </a:prstGeom>
-          <a:noFill/>
-          <a:ln w="34925">
-            <a:solidFill>
-              <a:schemeClr val="accent2"/>
-            </a:solidFill>
-          </a:ln>
-        </p:spPr>
-        <p:style>
-          <a:lnRef idx="2">
-            <a:schemeClr val="accent1">
-              <a:shade val="50000"/>
-            </a:schemeClr>
-          </a:lnRef>
-          <a:fillRef idx="1">
-            <a:schemeClr val="accent1"/>
-          </a:fillRef>
-          <a:effectRef idx="0">
-            <a:schemeClr val="accent1"/>
-          </a:effectRef>
-          <a:fontRef idx="minor">
-            <a:schemeClr val="lt1"/>
-          </a:fontRef>
-        </p:style>
-        <p:txBody>
-          <a:bodyPr rtlCol="0" anchor="ctr"/>
-          <a:lstStyle/>
-          <a:p>
-            <a:pPr algn="ctr"/>
-            <a:endParaRPr kumimoji="1" lang="ja-JP" altLang="en-US" sz="675"/>
-          </a:p>
-        </p:txBody>
-      </p:sp>
       <mc:AlternateContent xmlns:mc="http://schemas.openxmlformats.org/markup-compatibility/2006">
         <mc:Choice xmlns:a14="http://schemas.microsoft.com/office/drawing/2010/main" Requires="a14">
           <p:sp>
@@ -20759,15 +19728,7 @@
                 </a:pPr>
                 <a:r>
                   <a:rPr lang="en-US" sz="1400" dirty="0"/>
-                  <a:t>Creating data from a complete data model (specified to the </a:t>
-                </a:r>
-                <a:r>
-                  <a:rPr lang="en-US" sz="1400" dirty="0" err="1"/>
-                  <a:t>rightdddddss</a:t>
-                </a:r>
-                <a:r>
-                  <a:rPr lang="en-US" sz="1400" dirty="0"/>
-                  <a:t>)</a:t>
+                  <a:t>Creating data from a complete data model (specified to the right)</a:t>
                 </a:r>
               </a:p>
               <a:p>
@@ -20926,7 +19887,7 @@
                 <a:avLst/>
               </a:prstGeom>
               <a:blipFill>
-                <a:blip r:embed="rId15"/>
+                <a:blip r:embed="rId8"/>
                 <a:stretch>
                   <a:fillRect l="-196" t="-472"/>
                 </a:stretch>
@@ -21079,14 +20040,14 @@
           <p:nvPr>
             <p:extLst>
               <p:ext uri="{D42A27DB-BD31-4B8C-83A1-F6EECF244321}">
-                <p14:modId xmlns:p14="http://schemas.microsoft.com/office/powerpoint/2010/main" val="556610553"/>
+                <p14:modId xmlns:p14="http://schemas.microsoft.com/office/powerpoint/2010/main" val="355278212"/>
               </p:ext>
             </p:extLst>
           </p:nvPr>
         </p:nvGraphicFramePr>
         <p:xfrm>
-          <a:off x="11502465" y="7209973"/>
-          <a:ext cx="7577955" cy="2853686"/>
+          <a:off x="11597939" y="7381307"/>
+          <a:ext cx="6939820" cy="2417712"/>
         </p:xfrm>
         <a:graphic>
           <a:graphicData uri="http://schemas.openxmlformats.org/drawingml/2006/table">
@@ -21095,35 +20056,35 @@
                 <a:tableStyleId>{5C22544A-7EE6-4342-B048-85BDC9FD1C3A}</a:tableStyleId>
               </a:tblPr>
               <a:tblGrid>
-                <a:gridCol w="1515591">
+                <a:gridCol w="1387964">
                   <a:extLst>
                     <a:ext uri="{9D8B030D-6E8A-4147-A177-3AD203B41FA5}">
                       <a16:colId xmlns:a16="http://schemas.microsoft.com/office/drawing/2014/main" val="2639204986"/>
                     </a:ext>
                   </a:extLst>
                 </a:gridCol>
-                <a:gridCol w="1515591">
+                <a:gridCol w="1387964">
                   <a:extLst>
                     <a:ext uri="{9D8B030D-6E8A-4147-A177-3AD203B41FA5}">
                       <a16:colId xmlns:a16="http://schemas.microsoft.com/office/drawing/2014/main" val="2690891796"/>
                     </a:ext>
                   </a:extLst>
                 </a:gridCol>
-                <a:gridCol w="1515591">
+                <a:gridCol w="1387964">
                   <a:extLst>
                     <a:ext uri="{9D8B030D-6E8A-4147-A177-3AD203B41FA5}">
                       <a16:colId xmlns:a16="http://schemas.microsoft.com/office/drawing/2014/main" val="3723378948"/>
                     </a:ext>
                   </a:extLst>
                 </a:gridCol>
-                <a:gridCol w="1515591">
+                <a:gridCol w="1387964">
                   <a:extLst>
                     <a:ext uri="{9D8B030D-6E8A-4147-A177-3AD203B41FA5}">
                       <a16:colId xmlns:a16="http://schemas.microsoft.com/office/drawing/2014/main" val="1498371569"/>
                     </a:ext>
                   </a:extLst>
                 </a:gridCol>
-                <a:gridCol w="1515591">
+                <a:gridCol w="1387964">
                   <a:extLst>
                     <a:ext uri="{9D8B030D-6E8A-4147-A177-3AD203B41FA5}">
                       <a16:colId xmlns:a16="http://schemas.microsoft.com/office/drawing/2014/main" val="889807820"/>
@@ -21131,13 +20092,13 @@
                   </a:extLst>
                 </a:gridCol>
               </a:tblGrid>
-              <a:tr h="311078">
+              <a:tr h="247639">
                 <a:tc>
                   <a:txBody>
                     <a:bodyPr/>
                     <a:lstStyle/>
                     <a:p>
-                      <a:endParaRPr lang="en-US" sz="1800" dirty="0"/>
+                      <a:endParaRPr lang="en-US" sz="1400" dirty="0"/>
                     </a:p>
                   </a:txBody>
                   <a:tcPr marL="34290" marR="34290" marT="17145" marB="17145">
@@ -21161,10 +20122,10 @@
                     <a:lstStyle/>
                     <a:p>
                       <a:r>
-                        <a:rPr lang="en-US" sz="1800"/>
+                        <a:rPr lang="en-US" sz="1400"/>
                         <a:t>Estimate</a:t>
                       </a:r>
-                      <a:endParaRPr lang="en-US" sz="1800" dirty="0"/>
+                      <a:endParaRPr lang="en-US" sz="1400" dirty="0"/>
                     </a:p>
                   </a:txBody>
                   <a:tcPr marL="34290" marR="34290" marT="17145" marB="17145"/>
@@ -21175,10 +20136,10 @@
                     <a:lstStyle/>
                     <a:p>
                       <a:r>
-                        <a:rPr lang="en-US" sz="1800"/>
+                        <a:rPr lang="en-US" sz="1400"/>
                         <a:t>Percent Bias</a:t>
                       </a:r>
-                      <a:endParaRPr lang="en-US" sz="1800" dirty="0"/>
+                      <a:endParaRPr lang="en-US" sz="1400" dirty="0"/>
                     </a:p>
                   </a:txBody>
                   <a:tcPr marL="34290" marR="34290" marT="17145" marB="17145"/>
@@ -21189,10 +20150,10 @@
                     <a:lstStyle/>
                     <a:p>
                       <a:r>
-                        <a:rPr lang="en-US" sz="1800"/>
+                        <a:rPr lang="en-US" sz="1400"/>
                         <a:t>Coverage Rate</a:t>
                       </a:r>
-                      <a:endParaRPr lang="en-US" sz="1800" dirty="0"/>
+                      <a:endParaRPr lang="en-US" sz="1400" dirty="0"/>
                     </a:p>
                   </a:txBody>
                   <a:tcPr marL="34290" marR="34290" marT="17145" marB="17145"/>
@@ -21203,7 +20164,7 @@
                     <a:lstStyle/>
                     <a:p>
                       <a:r>
-                        <a:rPr lang="en-US" sz="1800" dirty="0"/>
+                        <a:rPr lang="en-US" sz="1400" dirty="0"/>
                         <a:t>Average Width</a:t>
                       </a:r>
                     </a:p>
@@ -21216,17 +20177,16 @@
                   </a:ext>
                 </a:extLst>
               </a:tr>
-              <a:tr h="311078">
+              <a:tr h="247639">
                 <a:tc>
                   <a:txBody>
                     <a:bodyPr/>
                     <a:lstStyle/>
                     <a:p>
                       <a:r>
-                        <a:rPr lang="en-US" sz="1800"/>
+                        <a:rPr lang="en-US" sz="1400" dirty="0"/>
                         <a:t>MCAR</a:t>
                       </a:r>
-                      <a:endParaRPr lang="en-US" sz="1800" dirty="0"/>
                     </a:p>
                   </a:txBody>
                   <a:tcPr marL="34290" marR="34290" marT="17145" marB="17145">
@@ -21241,10 +20201,9 @@
                     <a:lstStyle/>
                     <a:p>
                       <a:r>
-                        <a:rPr lang="en-US" sz="1800"/>
+                        <a:rPr lang="en-US" sz="1400" dirty="0"/>
                         <a:t>0.9779</a:t>
                       </a:r>
-                      <a:endParaRPr lang="en-US" sz="1800" dirty="0"/>
                     </a:p>
                   </a:txBody>
                   <a:tcPr marL="34290" marR="34290" marT="17145" marB="17145"/>
@@ -21255,10 +20214,10 @@
                     <a:lstStyle/>
                     <a:p>
                       <a:r>
-                        <a:rPr lang="en-US" sz="1800"/>
+                        <a:rPr lang="en-US" sz="1400"/>
                         <a:t>2.209</a:t>
                       </a:r>
-                      <a:endParaRPr lang="en-US" sz="1800" dirty="0"/>
+                      <a:endParaRPr lang="en-US" sz="1400" dirty="0"/>
                     </a:p>
                   </a:txBody>
                   <a:tcPr marL="34290" marR="34290" marT="17145" marB="17145"/>
@@ -21269,10 +20228,10 @@
                     <a:lstStyle/>
                     <a:p>
                       <a:r>
-                        <a:rPr lang="en-US" sz="1800"/>
+                        <a:rPr lang="en-US" sz="1400"/>
                         <a:t>0.97</a:t>
                       </a:r>
-                      <a:endParaRPr lang="en-US" sz="1800" dirty="0"/>
+                      <a:endParaRPr lang="en-US" sz="1400" dirty="0"/>
                     </a:p>
                   </a:txBody>
                   <a:tcPr marL="34290" marR="34290" marT="17145" marB="17145"/>
@@ -21283,10 +20242,10 @@
                     <a:lstStyle/>
                     <a:p>
                       <a:r>
-                        <a:rPr lang="en-US" sz="1800"/>
+                        <a:rPr lang="en-US" sz="1400"/>
                         <a:t>0.102</a:t>
                       </a:r>
-                      <a:endParaRPr lang="en-US" sz="1800" dirty="0"/>
+                      <a:endParaRPr lang="en-US" sz="1400" dirty="0"/>
                     </a:p>
                   </a:txBody>
                   <a:tcPr marL="34290" marR="34290" marT="17145" marB="17145"/>
@@ -21297,17 +20256,16 @@
                   </a:ext>
                 </a:extLst>
               </a:tr>
-              <a:tr h="311078">
+              <a:tr h="247639">
                 <a:tc>
                   <a:txBody>
                     <a:bodyPr/>
                     <a:lstStyle/>
                     <a:p>
                       <a:r>
-                        <a:rPr lang="en-US" sz="1800"/>
+                        <a:rPr lang="en-US" sz="1400" dirty="0"/>
                         <a:t>MAR-light</a:t>
                       </a:r>
-                      <a:endParaRPr lang="en-US" sz="1800" dirty="0"/>
                     </a:p>
                   </a:txBody>
                   <a:tcPr marL="34290" marR="34290" marT="17145" marB="17145">
@@ -21322,10 +20280,9 @@
                     <a:lstStyle/>
                     <a:p>
                       <a:r>
-                        <a:rPr lang="en-US" sz="1800"/>
+                        <a:rPr lang="en-US" sz="1400" dirty="0"/>
                         <a:t>0.9768</a:t>
                       </a:r>
-                      <a:endParaRPr lang="en-US" sz="1800" dirty="0"/>
                     </a:p>
                   </a:txBody>
                   <a:tcPr marL="34290" marR="34290" marT="17145" marB="17145"/>
@@ -21336,10 +20293,10 @@
                     <a:lstStyle/>
                     <a:p>
                       <a:r>
-                        <a:rPr lang="en-US" sz="1800"/>
+                        <a:rPr lang="en-US" sz="1400"/>
                         <a:t>2.315</a:t>
                       </a:r>
-                      <a:endParaRPr lang="en-US" sz="1800" dirty="0"/>
+                      <a:endParaRPr lang="en-US" sz="1400" dirty="0"/>
                     </a:p>
                   </a:txBody>
                   <a:tcPr marL="34290" marR="34290" marT="17145" marB="17145"/>
@@ -21350,10 +20307,9 @@
                     <a:lstStyle/>
                     <a:p>
                       <a:r>
-                        <a:rPr lang="en-US" sz="1800"/>
+                        <a:rPr lang="en-US" sz="1400" dirty="0"/>
                         <a:t>0.91</a:t>
                       </a:r>
-                      <a:endParaRPr lang="en-US" sz="1800" dirty="0"/>
                     </a:p>
                   </a:txBody>
                   <a:tcPr marL="34290" marR="34290" marT="17145" marB="17145"/>
@@ -21364,10 +20320,10 @@
                     <a:lstStyle/>
                     <a:p>
                       <a:r>
-                        <a:rPr lang="en-US" sz="1800"/>
+                        <a:rPr lang="en-US" sz="1400"/>
                         <a:t>0.108</a:t>
                       </a:r>
-                      <a:endParaRPr lang="en-US" sz="1800" dirty="0"/>
+                      <a:endParaRPr lang="en-US" sz="1400" dirty="0"/>
                     </a:p>
                   </a:txBody>
                   <a:tcPr marL="34290" marR="34290" marT="17145" marB="17145"/>
@@ -21378,17 +20334,17 @@
                   </a:ext>
                 </a:extLst>
               </a:tr>
-              <a:tr h="399626">
+              <a:tr h="464050">
                 <a:tc>
                   <a:txBody>
                     <a:bodyPr/>
                     <a:lstStyle/>
                     <a:p>
                       <a:r>
-                        <a:rPr lang="en-US" sz="1800"/>
+                        <a:rPr lang="en-US" sz="1400"/>
                         <a:t>MAR-moderate</a:t>
                       </a:r>
-                      <a:endParaRPr lang="en-US" sz="1800" dirty="0"/>
+                      <a:endParaRPr lang="en-US" sz="1400" dirty="0"/>
                     </a:p>
                   </a:txBody>
                   <a:tcPr marL="34290" marR="34290" marT="17145" marB="17145">
@@ -21403,10 +20359,9 @@
                     <a:lstStyle/>
                     <a:p>
                       <a:r>
-                        <a:rPr lang="en-US" sz="1800"/>
+                        <a:rPr lang="en-US" sz="1400" dirty="0"/>
                         <a:t>0.9799</a:t>
                       </a:r>
-                      <a:endParaRPr lang="en-US" sz="1800" dirty="0"/>
                     </a:p>
                   </a:txBody>
                   <a:tcPr marL="34290" marR="34290" marT="17145" marB="17145"/>
@@ -21417,10 +20372,9 @@
                     <a:lstStyle/>
                     <a:p>
                       <a:r>
-                        <a:rPr lang="en-US" sz="1800"/>
+                        <a:rPr lang="en-US" sz="1400" dirty="0"/>
                         <a:t>2.011</a:t>
                       </a:r>
-                      <a:endParaRPr lang="en-US" sz="1800" dirty="0"/>
                     </a:p>
                   </a:txBody>
                   <a:tcPr marL="34290" marR="34290" marT="17145" marB="17145"/>
@@ -21431,10 +20385,10 @@
                     <a:lstStyle/>
                     <a:p>
                       <a:r>
-                        <a:rPr lang="en-US" sz="1800"/>
+                        <a:rPr lang="en-US" sz="1400"/>
                         <a:t>0.91</a:t>
                       </a:r>
-                      <a:endParaRPr lang="en-US" sz="1800" dirty="0"/>
+                      <a:endParaRPr lang="en-US" sz="1400" dirty="0"/>
                     </a:p>
                   </a:txBody>
                   <a:tcPr marL="34290" marR="34290" marT="17145" marB="17145"/>
@@ -21445,10 +20399,9 @@
                     <a:lstStyle/>
                     <a:p>
                       <a:r>
-                        <a:rPr lang="en-US" sz="1800"/>
+                        <a:rPr lang="en-US" sz="1400" dirty="0"/>
                         <a:t>0.095</a:t>
                       </a:r>
-                      <a:endParaRPr lang="en-US" sz="1800" dirty="0"/>
                     </a:p>
                   </a:txBody>
                   <a:tcPr marL="34290" marR="34290" marT="17145" marB="17145"/>
@@ -21459,17 +20412,17 @@
                   </a:ext>
                 </a:extLst>
               </a:tr>
-              <a:tr h="311078">
+              <a:tr h="247639">
                 <a:tc>
                   <a:txBody>
                     <a:bodyPr/>
                     <a:lstStyle/>
                     <a:p>
                       <a:r>
-                        <a:rPr lang="en-US" sz="1800"/>
+                        <a:rPr lang="en-US" sz="1400"/>
                         <a:t>MAR-heavy</a:t>
                       </a:r>
-                      <a:endParaRPr lang="en-US" sz="1800" dirty="0"/>
+                      <a:endParaRPr lang="en-US" sz="1400" dirty="0"/>
                     </a:p>
                   </a:txBody>
                   <a:tcPr marL="34290" marR="34290" marT="17145" marB="17145">
@@ -21484,10 +20437,10 @@
                     <a:lstStyle/>
                     <a:p>
                       <a:r>
-                        <a:rPr lang="en-US" sz="1800"/>
+                        <a:rPr lang="en-US" sz="1400"/>
                         <a:t>0.9841</a:t>
                       </a:r>
-                      <a:endParaRPr lang="en-US" sz="1800" dirty="0"/>
+                      <a:endParaRPr lang="en-US" sz="1400" dirty="0"/>
                     </a:p>
                   </a:txBody>
                   <a:tcPr marL="34290" marR="34290" marT="17145" marB="17145"/>
@@ -21498,10 +20451,9 @@
                     <a:lstStyle/>
                     <a:p>
                       <a:r>
-                        <a:rPr lang="en-US" sz="1800"/>
+                        <a:rPr lang="en-US" sz="1400" dirty="0"/>
                         <a:t>1.588</a:t>
                       </a:r>
-                      <a:endParaRPr lang="en-US" sz="1800" dirty="0"/>
                     </a:p>
                   </a:txBody>
                   <a:tcPr marL="34290" marR="34290" marT="17145" marB="17145"/>
@@ -21512,10 +20464,9 @@
                     <a:lstStyle/>
                     <a:p>
                       <a:r>
-                        <a:rPr lang="en-US" sz="1800"/>
+                        <a:rPr lang="en-US" sz="1400" dirty="0"/>
                         <a:t>0.90</a:t>
                       </a:r>
-                      <a:endParaRPr lang="en-US" sz="1800" dirty="0"/>
                     </a:p>
                   </a:txBody>
                   <a:tcPr marL="34290" marR="34290" marT="17145" marB="17145"/>
@@ -21526,10 +20477,10 @@
                     <a:lstStyle/>
                     <a:p>
                       <a:r>
-                        <a:rPr lang="en-US" sz="1800"/>
+                        <a:rPr lang="en-US" sz="1400"/>
                         <a:t>0.082</a:t>
                       </a:r>
-                      <a:endParaRPr lang="en-US" sz="1800" dirty="0"/>
+                      <a:endParaRPr lang="en-US" sz="1400" dirty="0"/>
                     </a:p>
                   </a:txBody>
                   <a:tcPr marL="34290" marR="34290" marT="17145" marB="17145"/>
@@ -21540,17 +20491,17 @@
                   </a:ext>
                 </a:extLst>
               </a:tr>
-              <a:tr h="311078">
+              <a:tr h="247639">
                 <a:tc>
                   <a:txBody>
                     <a:bodyPr/>
                     <a:lstStyle/>
                     <a:p>
                       <a:r>
-                        <a:rPr lang="en-US" sz="1800"/>
+                        <a:rPr lang="en-US" sz="1400"/>
                         <a:t>MNAR-light</a:t>
                       </a:r>
-                      <a:endParaRPr lang="en-US" sz="1800" dirty="0"/>
+                      <a:endParaRPr lang="en-US" sz="1400" dirty="0"/>
                     </a:p>
                   </a:txBody>
                   <a:tcPr marL="34290" marR="34290" marT="17145" marB="17145">
@@ -21565,10 +20516,10 @@
                     <a:lstStyle/>
                     <a:p>
                       <a:r>
-                        <a:rPr lang="en-US" sz="1800"/>
+                        <a:rPr lang="en-US" sz="1400"/>
                         <a:t>1.0174</a:t>
                       </a:r>
-                      <a:endParaRPr lang="en-US" sz="1800" dirty="0"/>
+                      <a:endParaRPr lang="en-US" sz="1400" dirty="0"/>
                     </a:p>
                   </a:txBody>
                   <a:tcPr marL="34290" marR="34290" marT="17145" marB="17145"/>
@@ -21579,10 +20530,10 @@
                     <a:lstStyle/>
                     <a:p>
                       <a:r>
-                        <a:rPr lang="en-US" sz="1800"/>
+                        <a:rPr lang="en-US" sz="1400"/>
                         <a:t>1.740</a:t>
                       </a:r>
-                      <a:endParaRPr lang="en-US" sz="1800" dirty="0"/>
+                      <a:endParaRPr lang="en-US" sz="1400" dirty="0"/>
                     </a:p>
                   </a:txBody>
                   <a:tcPr marL="34290" marR="34290" marT="17145" marB="17145"/>
@@ -21593,10 +20544,9 @@
                     <a:lstStyle/>
                     <a:p>
                       <a:r>
-                        <a:rPr lang="en-US" sz="1800"/>
+                        <a:rPr lang="en-US" sz="1400" dirty="0"/>
                         <a:t>0.96</a:t>
                       </a:r>
-                      <a:endParaRPr lang="en-US" sz="1800" dirty="0"/>
                     </a:p>
                   </a:txBody>
                   <a:tcPr marL="34290" marR="34290" marT="17145" marB="17145"/>
@@ -21607,10 +20557,9 @@
                     <a:lstStyle/>
                     <a:p>
                       <a:r>
-                        <a:rPr lang="en-US" sz="1800"/>
+                        <a:rPr lang="en-US" sz="1400" dirty="0"/>
                         <a:t>0.306</a:t>
                       </a:r>
-                      <a:endParaRPr lang="en-US" sz="1800" dirty="0"/>
                     </a:p>
                   </a:txBody>
                   <a:tcPr marL="34290" marR="34290" marT="17145" marB="17145"/>
@@ -21621,17 +20570,17 @@
                   </a:ext>
                 </a:extLst>
               </a:tr>
-              <a:tr h="587592">
+              <a:tr h="467762">
                 <a:tc>
                   <a:txBody>
                     <a:bodyPr/>
                     <a:lstStyle/>
                     <a:p>
                       <a:r>
-                        <a:rPr lang="en-US" sz="1800"/>
+                        <a:rPr lang="en-US" sz="1400"/>
                         <a:t>MNAR-moderate</a:t>
                       </a:r>
-                      <a:endParaRPr lang="en-US" sz="1800" dirty="0"/>
+                      <a:endParaRPr lang="en-US" sz="1400" dirty="0"/>
                     </a:p>
                   </a:txBody>
                   <a:tcPr marL="34290" marR="34290" marT="17145" marB="17145">
@@ -21646,10 +20595,9 @@
                     <a:lstStyle/>
                     <a:p>
                       <a:r>
-                        <a:rPr lang="en-US" sz="1800"/>
+                        <a:rPr lang="en-US" sz="1400" dirty="0"/>
                         <a:t>1.0262</a:t>
                       </a:r>
-                      <a:endParaRPr lang="en-US" sz="1800" dirty="0"/>
                     </a:p>
                   </a:txBody>
                   <a:tcPr marL="34290" marR="34290" marT="17145" marB="17145"/>
@@ -21660,10 +20608,10 @@
                     <a:lstStyle/>
                     <a:p>
                       <a:r>
-                        <a:rPr lang="en-US" sz="1800"/>
+                        <a:rPr lang="en-US" sz="1400"/>
                         <a:t>2.615</a:t>
                       </a:r>
-                      <a:endParaRPr lang="en-US" sz="1800" dirty="0"/>
+                      <a:endParaRPr lang="en-US" sz="1400" dirty="0"/>
                     </a:p>
                   </a:txBody>
                   <a:tcPr marL="34290" marR="34290" marT="17145" marB="17145"/>
@@ -21674,10 +20622,10 @@
                     <a:lstStyle/>
                     <a:p>
                       <a:r>
-                        <a:rPr lang="en-US" sz="1800"/>
+                        <a:rPr lang="en-US" sz="1400"/>
                         <a:t>0.95</a:t>
                       </a:r>
-                      <a:endParaRPr lang="en-US" sz="1800" dirty="0"/>
+                      <a:endParaRPr lang="en-US" sz="1400" dirty="0"/>
                     </a:p>
                   </a:txBody>
                   <a:tcPr marL="34290" marR="34290" marT="17145" marB="17145"/>
@@ -21688,10 +20636,9 @@
                     <a:lstStyle/>
                     <a:p>
                       <a:r>
-                        <a:rPr lang="en-US" sz="1800"/>
+                        <a:rPr lang="en-US" sz="1400" dirty="0"/>
                         <a:t>0.331</a:t>
                       </a:r>
-                      <a:endParaRPr lang="en-US" sz="1800" dirty="0"/>
                     </a:p>
                   </a:txBody>
                   <a:tcPr marL="34290" marR="34290" marT="17145" marB="17145"/>
@@ -21702,17 +20649,17 @@
                   </a:ext>
                 </a:extLst>
               </a:tr>
-              <a:tr h="311078">
+              <a:tr h="247639">
                 <a:tc>
                   <a:txBody>
                     <a:bodyPr/>
                     <a:lstStyle/>
                     <a:p>
                       <a:r>
-                        <a:rPr lang="en-US" sz="1800"/>
+                        <a:rPr lang="en-US" sz="1400"/>
                         <a:t>MNAR-heavy</a:t>
                       </a:r>
-                      <a:endParaRPr lang="en-US" sz="1800" dirty="0"/>
+                      <a:endParaRPr lang="en-US" sz="1400" dirty="0"/>
                     </a:p>
                   </a:txBody>
                   <a:tcPr marL="34290" marR="34290" marT="17145" marB="17145">
@@ -21727,10 +20674,9 @@
                     <a:lstStyle/>
                     <a:p>
                       <a:r>
-                        <a:rPr lang="en-US" sz="1800"/>
-                        <a:t>1.0485</a:t>
+                        <a:rPr lang="en-US" sz="1400" dirty="0"/>
+                        <a:t>1.3146</a:t>
                       </a:r>
-                      <a:endParaRPr lang="en-US" sz="1800" dirty="0"/>
                     </a:p>
                   </a:txBody>
                   <a:tcPr marL="34290" marR="34290" marT="17145" marB="17145"/>
@@ -21741,10 +20687,9 @@
                     <a:lstStyle/>
                     <a:p>
                       <a:r>
-                        <a:rPr lang="en-US" sz="1800"/>
-                        <a:t>4.853</a:t>
+                        <a:rPr lang="en-US" sz="1400" dirty="0"/>
+                        <a:t>31.463</a:t>
                       </a:r>
-                      <a:endParaRPr lang="en-US" sz="1800" dirty="0"/>
                     </a:p>
                   </a:txBody>
                   <a:tcPr marL="34290" marR="34290" marT="17145" marB="17145"/>
@@ -21755,10 +20700,9 @@
                     <a:lstStyle/>
                     <a:p>
                       <a:r>
-                        <a:rPr lang="en-US" sz="1800"/>
-                        <a:t>0.88</a:t>
+                        <a:rPr lang="en-US" sz="1400" dirty="0"/>
+                        <a:t>0.57</a:t>
                       </a:r>
-                      <a:endParaRPr lang="en-US" sz="1800" dirty="0"/>
                     </a:p>
                   </a:txBody>
                   <a:tcPr marL="34290" marR="34290" marT="17145" marB="17145"/>
@@ -21769,8 +20713,8 @@
                     <a:lstStyle/>
                     <a:p>
                       <a:r>
-                        <a:rPr lang="en-US" sz="1800" dirty="0"/>
-                        <a:t>0.388</a:t>
+                        <a:rPr lang="en-US" sz="1400" dirty="0"/>
+                        <a:t>0.806</a:t>
                       </a:r>
                     </a:p>
                   </a:txBody>
@@ -21825,6 +20769,2054 @@
           </a:p>
         </p:txBody>
       </p:sp>
+      <p:pic>
+        <p:nvPicPr>
+          <p:cNvPr id="862" name="Picture 861" descr="Chart, box and whisker chart&#10;&#10;Description automatically generated">
+            <a:extLst>
+              <a:ext uri="{FF2B5EF4-FFF2-40B4-BE49-F238E27FC236}">
+                <a16:creationId xmlns:a16="http://schemas.microsoft.com/office/drawing/2014/main" id="{9410FDE2-C78B-4915-3449-1C4ED8DE2DA2}"/>
+              </a:ext>
+            </a:extLst>
+          </p:cNvPr>
+          <p:cNvPicPr>
+            <a:picLocks noChangeAspect="1"/>
+          </p:cNvPicPr>
+          <p:nvPr/>
+        </p:nvPicPr>
+        <p:blipFill>
+          <a:blip r:embed="rId9">
+            <a:alphaModFix/>
+          </a:blip>
+          <a:stretch>
+            <a:fillRect/>
+          </a:stretch>
+        </p:blipFill>
+        <p:spPr>
+          <a:xfrm>
+            <a:off x="14610327" y="10183977"/>
+            <a:ext cx="6372232" cy="3425761"/>
+          </a:xfrm>
+          <a:prstGeom prst="rect">
+            <a:avLst/>
+          </a:prstGeom>
+        </p:spPr>
+      </p:pic>
+      <p:sp>
+        <p:nvSpPr>
+          <p:cNvPr id="863" name="TextBox 862">
+            <a:extLst>
+              <a:ext uri="{FF2B5EF4-FFF2-40B4-BE49-F238E27FC236}">
+                <a16:creationId xmlns:a16="http://schemas.microsoft.com/office/drawing/2014/main" id="{AAB41BC9-7B5F-7DF3-168B-DBB58AB88406}"/>
+              </a:ext>
+            </a:extLst>
+          </p:cNvPr>
+          <p:cNvSpPr txBox="1"/>
+          <p:nvPr/>
+        </p:nvSpPr>
+        <p:spPr>
+          <a:xfrm>
+            <a:off x="11375581" y="13732309"/>
+            <a:ext cx="1359668" cy="369332"/>
+          </a:xfrm>
+          <a:prstGeom prst="rect">
+            <a:avLst/>
+          </a:prstGeom>
+          <a:noFill/>
+        </p:spPr>
+        <p:txBody>
+          <a:bodyPr wrap="none" rtlCol="0">
+            <a:spAutoFit/>
+          </a:bodyPr>
+          <a:lstStyle/>
+          <a:p>
+            <a:r>
+              <a:rPr lang="en-US" b="1" u="sng" dirty="0">
+                <a:solidFill>
+                  <a:schemeClr val="accent2"/>
+                </a:solidFill>
+              </a:rPr>
+              <a:t>DISCUSSION</a:t>
+            </a:r>
+          </a:p>
+        </p:txBody>
+      </p:sp>
+      <p:sp>
+        <p:nvSpPr>
+          <p:cNvPr id="864" name="TextBox 863">
+            <a:extLst>
+              <a:ext uri="{FF2B5EF4-FFF2-40B4-BE49-F238E27FC236}">
+                <a16:creationId xmlns:a16="http://schemas.microsoft.com/office/drawing/2014/main" id="{DCA08361-4B4C-0542-108A-6C06875EE2CE}"/>
+              </a:ext>
+            </a:extLst>
+          </p:cNvPr>
+          <p:cNvSpPr txBox="1"/>
+          <p:nvPr/>
+        </p:nvSpPr>
+        <p:spPr>
+          <a:xfrm>
+            <a:off x="11964692" y="14117289"/>
+            <a:ext cx="9080939" cy="1754326"/>
+          </a:xfrm>
+          <a:prstGeom prst="rect">
+            <a:avLst/>
+          </a:prstGeom>
+          <a:noFill/>
+        </p:spPr>
+        <p:txBody>
+          <a:bodyPr wrap="square" rtlCol="0">
+            <a:spAutoFit/>
+          </a:bodyPr>
+          <a:lstStyle/>
+          <a:p>
+            <a:pPr marL="285750" indent="-285750">
+              <a:buFont typeface="Arial" panose="020B0604020202020204" pitchFamily="34" charset="0"/>
+              <a:buChar char="•"/>
+            </a:pPr>
+            <a:r>
+              <a:rPr lang="en-US" dirty="0"/>
+              <a:t>Bias and average confidence interval width tended to increase as the mechanism’s severity increased. </a:t>
+            </a:r>
+          </a:p>
+          <a:p>
+            <a:pPr marL="285750" indent="-285750">
+              <a:buFont typeface="Arial" panose="020B0604020202020204" pitchFamily="34" charset="0"/>
+              <a:buChar char="•"/>
+            </a:pPr>
+            <a:r>
+              <a:rPr lang="en-US" dirty="0"/>
+              <a:t>Although true MAR had the lowest average coverage rate, once we consider how MNAR had much larger confidence intervals, MNAR is clearly the worst at accurately estimating our parameter</a:t>
+            </a:r>
+          </a:p>
+          <a:p>
+            <a:pPr marL="285750" indent="-285750">
+              <a:buFont typeface="Arial" panose="020B0604020202020204" pitchFamily="34" charset="0"/>
+              <a:buChar char="•"/>
+            </a:pPr>
+            <a:endParaRPr lang="en-US" dirty="0"/>
+          </a:p>
+        </p:txBody>
+      </p:sp>
+      <p:sp>
+        <p:nvSpPr>
+          <p:cNvPr id="865" name="TextBox 864">
+            <a:extLst>
+              <a:ext uri="{FF2B5EF4-FFF2-40B4-BE49-F238E27FC236}">
+                <a16:creationId xmlns:a16="http://schemas.microsoft.com/office/drawing/2014/main" id="{E2EEE3A7-764D-A342-4B80-78A777112790}"/>
+              </a:ext>
+            </a:extLst>
+          </p:cNvPr>
+          <p:cNvSpPr txBox="1"/>
+          <p:nvPr/>
+        </p:nvSpPr>
+        <p:spPr>
+          <a:xfrm>
+            <a:off x="22534417" y="3313740"/>
+            <a:ext cx="4085029" cy="369332"/>
+          </a:xfrm>
+          <a:prstGeom prst="rect">
+            <a:avLst/>
+          </a:prstGeom>
+          <a:noFill/>
+        </p:spPr>
+        <p:txBody>
+          <a:bodyPr wrap="none" rtlCol="0">
+            <a:spAutoFit/>
+          </a:bodyPr>
+          <a:lstStyle/>
+          <a:p>
+            <a:r>
+              <a:rPr lang="en-US" b="1" dirty="0">
+                <a:solidFill>
+                  <a:schemeClr val="accent2">
+                    <a:lumMod val="75000"/>
+                  </a:schemeClr>
+                </a:solidFill>
+              </a:rPr>
+              <a:t>Case 1: Missing Data only in Response </a:t>
+            </a:r>
+            <a:r>
+              <a:rPr lang="en-US" b="1" i="1" dirty="0">
+                <a:solidFill>
+                  <a:schemeClr val="accent2">
+                    <a:lumMod val="75000"/>
+                  </a:schemeClr>
+                </a:solidFill>
+              </a:rPr>
+              <a:t>Y</a:t>
+            </a:r>
+            <a:r>
+              <a:rPr lang="en-US" b="1" dirty="0">
+                <a:solidFill>
+                  <a:schemeClr val="accent2">
+                    <a:lumMod val="75000"/>
+                  </a:schemeClr>
+                </a:solidFill>
+              </a:rPr>
+              <a:t>  </a:t>
+            </a:r>
+          </a:p>
+        </p:txBody>
+      </p:sp>
+      <mc:AlternateContent xmlns:mc="http://schemas.openxmlformats.org/markup-compatibility/2006">
+        <mc:Choice xmlns:a14="http://schemas.microsoft.com/office/drawing/2010/main" Requires="a14">
+          <p:sp>
+            <p:nvSpPr>
+              <p:cNvPr id="866" name="TextBox 865">
+                <a:extLst>
+                  <a:ext uri="{FF2B5EF4-FFF2-40B4-BE49-F238E27FC236}">
+                    <a16:creationId xmlns:a16="http://schemas.microsoft.com/office/drawing/2014/main" id="{C7D4E343-7ECF-5508-C316-F7FAA70EE3B2}"/>
+                  </a:ext>
+                </a:extLst>
+              </p:cNvPr>
+              <p:cNvSpPr txBox="1"/>
+              <p:nvPr/>
+            </p:nvSpPr>
+            <p:spPr>
+              <a:xfrm>
+                <a:off x="22770814" y="3683071"/>
+                <a:ext cx="9708673" cy="2546851"/>
+              </a:xfrm>
+              <a:prstGeom prst="rect">
+                <a:avLst/>
+              </a:prstGeom>
+              <a:noFill/>
+            </p:spPr>
+            <p:txBody>
+              <a:bodyPr wrap="square">
+                <a:spAutoFit/>
+              </a:bodyPr>
+              <a:lstStyle/>
+              <a:p>
+                <a:pPr>
+                  <a:lnSpc>
+                    <a:spcPct val="150000"/>
+                  </a:lnSpc>
+                </a:pPr>
+                <a:r>
+                  <a:rPr lang="en-US" sz="1400" b="1" u="sng" dirty="0">
+                    <a:solidFill>
+                      <a:schemeClr val="accent2"/>
+                    </a:solidFill>
+                  </a:rPr>
+                  <a:t>HYPOTHESIS</a:t>
+                </a:r>
+                <a:r>
+                  <a:rPr lang="en-US" sz="1400" b="1" dirty="0">
+                    <a:solidFill>
+                      <a:schemeClr val="accent2"/>
+                    </a:solidFill>
+                  </a:rPr>
+                  <a:t>: </a:t>
+                </a:r>
+                <a:r>
+                  <a:rPr lang="en-US" sz="1400" b="1" dirty="0"/>
+                  <a:t>If the missing data occurs only in </a:t>
+                </a:r>
+                <a:r>
+                  <a:rPr lang="en-US" sz="1400" b="1" i="1" dirty="0"/>
+                  <a:t>Y, </a:t>
+                </a:r>
+                <a:r>
+                  <a:rPr lang="en-US" sz="1400" b="1" dirty="0"/>
+                  <a:t>listwise deletion is preferred as it’s faster, efficient, and statistically equivalent.</a:t>
+                </a:r>
+                <a:endParaRPr lang="en-US" sz="1088" b="1" dirty="0"/>
+              </a:p>
+              <a:p>
+                <a:pPr>
+                  <a:lnSpc>
+                    <a:spcPct val="150000"/>
+                  </a:lnSpc>
+                </a:pPr>
+                <a:r>
+                  <a:rPr lang="en-US" sz="1400" b="1" u="sng" dirty="0">
+                    <a:solidFill>
+                      <a:schemeClr val="accent2"/>
+                    </a:solidFill>
+                  </a:rPr>
+                  <a:t>METHODS:</a:t>
+                </a:r>
+                <a:endParaRPr lang="en-US" sz="1400" b="1" dirty="0"/>
+              </a:p>
+              <a:p>
+                <a:pPr marL="228600" indent="-228600">
+                  <a:lnSpc>
+                    <a:spcPct val="150000"/>
+                  </a:lnSpc>
+                  <a:buFont typeface="+mj-lt"/>
+                  <a:buAutoNum type="arabicPeriod"/>
+                </a:pPr>
+                <a:r>
+                  <a:rPr lang="en-US" sz="1088" dirty="0"/>
+                  <a:t>Create data from model </a:t>
+                </a:r>
+                <a14:m>
+                  <m:oMath xmlns:m="http://schemas.openxmlformats.org/officeDocument/2006/math">
+                    <m:sSub>
+                      <m:sSubPr>
+                        <m:ctrlPr>
+                          <a:rPr lang="en-US" sz="1088" b="1" i="1">
+                            <a:latin typeface="Cambria Math" panose="02040503050406030204" pitchFamily="18" charset="0"/>
+                          </a:rPr>
+                        </m:ctrlPr>
+                      </m:sSubPr>
+                      <m:e>
+                        <m:r>
+                          <a:rPr lang="en-US" sz="1088" b="1" i="1">
+                            <a:latin typeface="Cambria Math" panose="02040503050406030204" pitchFamily="18" charset="0"/>
+                          </a:rPr>
+                          <m:t>𝒚</m:t>
+                        </m:r>
+                      </m:e>
+                      <m:sub>
+                        <m:r>
+                          <a:rPr lang="en-US" sz="1088" b="1" i="1">
+                            <a:latin typeface="Cambria Math" panose="02040503050406030204" pitchFamily="18" charset="0"/>
+                          </a:rPr>
+                          <m:t>𝒊</m:t>
+                        </m:r>
+                      </m:sub>
+                    </m:sSub>
+                    <m:r>
+                      <a:rPr lang="en-US" sz="1088" b="1" i="1">
+                        <a:latin typeface="Cambria Math" panose="02040503050406030204" pitchFamily="18" charset="0"/>
+                      </a:rPr>
+                      <m:t>=</m:t>
+                    </m:r>
+                    <m:sSub>
+                      <m:sSubPr>
+                        <m:ctrlPr>
+                          <a:rPr lang="en-US" sz="1088" b="1" i="1">
+                            <a:latin typeface="Cambria Math" panose="02040503050406030204" pitchFamily="18" charset="0"/>
+                          </a:rPr>
+                        </m:ctrlPr>
+                      </m:sSubPr>
+                      <m:e>
+                        <m:r>
+                          <a:rPr lang="en-US" sz="1088" b="1" i="1">
+                            <a:latin typeface="Cambria Math" panose="02040503050406030204" pitchFamily="18" charset="0"/>
+                          </a:rPr>
+                          <m:t>𝒙</m:t>
+                        </m:r>
+                      </m:e>
+                      <m:sub>
+                        <m:r>
+                          <a:rPr lang="en-US" sz="1088" b="1" i="1">
+                            <a:latin typeface="Cambria Math" panose="02040503050406030204" pitchFamily="18" charset="0"/>
+                          </a:rPr>
+                          <m:t>𝟏</m:t>
+                        </m:r>
+                        <m:r>
+                          <a:rPr lang="en-US" sz="1088" b="1" i="1">
+                            <a:latin typeface="Cambria Math" panose="02040503050406030204" pitchFamily="18" charset="0"/>
+                          </a:rPr>
+                          <m:t>,</m:t>
+                        </m:r>
+                        <m:r>
+                          <a:rPr lang="en-US" sz="1088" b="1" i="1">
+                            <a:latin typeface="Cambria Math" panose="02040503050406030204" pitchFamily="18" charset="0"/>
+                          </a:rPr>
+                          <m:t>𝒊</m:t>
+                        </m:r>
+                      </m:sub>
+                    </m:sSub>
+                    <m:sSub>
+                      <m:sSubPr>
+                        <m:ctrlPr>
+                          <a:rPr lang="en-US" sz="1088" b="1" i="1">
+                            <a:latin typeface="Cambria Math" panose="02040503050406030204" pitchFamily="18" charset="0"/>
+                          </a:rPr>
+                        </m:ctrlPr>
+                      </m:sSubPr>
+                      <m:e>
+                        <m:r>
+                          <a:rPr lang="en-US" sz="1088" b="1" i="1">
+                            <a:latin typeface="Cambria Math" panose="02040503050406030204" pitchFamily="18" charset="0"/>
+                          </a:rPr>
+                          <m:t>𝜷</m:t>
+                        </m:r>
+                      </m:e>
+                      <m:sub>
+                        <m:r>
+                          <a:rPr lang="en-US" sz="1088" b="1" i="1">
+                            <a:latin typeface="Cambria Math" panose="02040503050406030204" pitchFamily="18" charset="0"/>
+                          </a:rPr>
+                          <m:t>𝟏</m:t>
+                        </m:r>
+                      </m:sub>
+                    </m:sSub>
+                    <m:r>
+                      <a:rPr lang="en-US" sz="1088" b="1" i="1">
+                        <a:latin typeface="Cambria Math" panose="02040503050406030204" pitchFamily="18" charset="0"/>
+                      </a:rPr>
+                      <m:t>+</m:t>
+                    </m:r>
+                    <m:sSub>
+                      <m:sSubPr>
+                        <m:ctrlPr>
+                          <a:rPr lang="en-US" sz="1088" b="1" i="1">
+                            <a:latin typeface="Cambria Math" panose="02040503050406030204" pitchFamily="18" charset="0"/>
+                          </a:rPr>
+                        </m:ctrlPr>
+                      </m:sSubPr>
+                      <m:e>
+                        <m:r>
+                          <a:rPr lang="en-US" sz="1088" b="1" i="1">
+                            <a:latin typeface="Cambria Math" panose="02040503050406030204" pitchFamily="18" charset="0"/>
+                          </a:rPr>
+                          <m:t>𝒙</m:t>
+                        </m:r>
+                      </m:e>
+                      <m:sub>
+                        <m:r>
+                          <a:rPr lang="en-US" sz="1088" b="1" i="1">
+                            <a:latin typeface="Cambria Math" panose="02040503050406030204" pitchFamily="18" charset="0"/>
+                          </a:rPr>
+                          <m:t>𝟐</m:t>
+                        </m:r>
+                        <m:r>
+                          <a:rPr lang="en-US" sz="1088" b="1" i="1">
+                            <a:latin typeface="Cambria Math" panose="02040503050406030204" pitchFamily="18" charset="0"/>
+                          </a:rPr>
+                          <m:t>,</m:t>
+                        </m:r>
+                        <m:r>
+                          <a:rPr lang="en-US" sz="1088" b="1" i="1">
+                            <a:latin typeface="Cambria Math" panose="02040503050406030204" pitchFamily="18" charset="0"/>
+                          </a:rPr>
+                          <m:t>𝒊</m:t>
+                        </m:r>
+                      </m:sub>
+                    </m:sSub>
+                    <m:sSub>
+                      <m:sSubPr>
+                        <m:ctrlPr>
+                          <a:rPr lang="en-US" sz="1088" b="1" i="1">
+                            <a:latin typeface="Cambria Math" panose="02040503050406030204" pitchFamily="18" charset="0"/>
+                          </a:rPr>
+                        </m:ctrlPr>
+                      </m:sSubPr>
+                      <m:e>
+                        <m:r>
+                          <a:rPr lang="en-US" sz="1088" b="1" i="1">
+                            <a:latin typeface="Cambria Math" panose="02040503050406030204" pitchFamily="18" charset="0"/>
+                          </a:rPr>
+                          <m:t>𝜷</m:t>
+                        </m:r>
+                      </m:e>
+                      <m:sub>
+                        <m:r>
+                          <a:rPr lang="en-US" sz="1088" b="1" i="1">
+                            <a:latin typeface="Cambria Math" panose="02040503050406030204" pitchFamily="18" charset="0"/>
+                          </a:rPr>
+                          <m:t>𝟐</m:t>
+                        </m:r>
+                      </m:sub>
+                    </m:sSub>
+                    <m:r>
+                      <a:rPr lang="en-US" sz="1088" b="1" i="1">
+                        <a:latin typeface="Cambria Math" panose="02040503050406030204" pitchFamily="18" charset="0"/>
+                      </a:rPr>
+                      <m:t>+</m:t>
+                    </m:r>
+                    <m:sSub>
+                      <m:sSubPr>
+                        <m:ctrlPr>
+                          <a:rPr lang="en-US" sz="1088" b="1" i="1">
+                            <a:latin typeface="Cambria Math" panose="02040503050406030204" pitchFamily="18" charset="0"/>
+                          </a:rPr>
+                        </m:ctrlPr>
+                      </m:sSubPr>
+                      <m:e>
+                        <m:r>
+                          <a:rPr lang="en-US" sz="1088" b="1" i="1">
+                            <a:latin typeface="Cambria Math" panose="02040503050406030204" pitchFamily="18" charset="0"/>
+                          </a:rPr>
+                          <m:t>𝒙</m:t>
+                        </m:r>
+                      </m:e>
+                      <m:sub>
+                        <m:r>
+                          <a:rPr lang="en-US" sz="1088" b="1" i="1">
+                            <a:latin typeface="Cambria Math" panose="02040503050406030204" pitchFamily="18" charset="0"/>
+                          </a:rPr>
+                          <m:t>𝟑</m:t>
+                        </m:r>
+                        <m:r>
+                          <a:rPr lang="en-US" sz="1088" b="1" i="1">
+                            <a:latin typeface="Cambria Math" panose="02040503050406030204" pitchFamily="18" charset="0"/>
+                          </a:rPr>
+                          <m:t>,</m:t>
+                        </m:r>
+                        <m:r>
+                          <a:rPr lang="en-US" sz="1088" b="1" i="1">
+                            <a:latin typeface="Cambria Math" panose="02040503050406030204" pitchFamily="18" charset="0"/>
+                          </a:rPr>
+                          <m:t>𝒊</m:t>
+                        </m:r>
+                      </m:sub>
+                    </m:sSub>
+                    <m:sSub>
+                      <m:sSubPr>
+                        <m:ctrlPr>
+                          <a:rPr lang="en-US" sz="1088" b="1" i="1">
+                            <a:latin typeface="Cambria Math" panose="02040503050406030204" pitchFamily="18" charset="0"/>
+                          </a:rPr>
+                        </m:ctrlPr>
+                      </m:sSubPr>
+                      <m:e>
+                        <m:r>
+                          <a:rPr lang="en-US" sz="1088" b="1" i="1">
+                            <a:latin typeface="Cambria Math" panose="02040503050406030204" pitchFamily="18" charset="0"/>
+                          </a:rPr>
+                          <m:t>𝜷</m:t>
+                        </m:r>
+                      </m:e>
+                      <m:sub>
+                        <m:r>
+                          <a:rPr lang="en-US" sz="1088" b="1" i="1">
+                            <a:latin typeface="Cambria Math" panose="02040503050406030204" pitchFamily="18" charset="0"/>
+                          </a:rPr>
+                          <m:t>𝟑</m:t>
+                        </m:r>
+                      </m:sub>
+                    </m:sSub>
+                    <m:r>
+                      <a:rPr lang="en-US" sz="1088" b="1" i="1">
+                        <a:latin typeface="Cambria Math" panose="02040503050406030204" pitchFamily="18" charset="0"/>
+                      </a:rPr>
+                      <m:t>+</m:t>
+                    </m:r>
+                    <m:sSub>
+                      <m:sSubPr>
+                        <m:ctrlPr>
+                          <a:rPr lang="en-US" sz="1088" b="1" i="1">
+                            <a:latin typeface="Cambria Math" panose="02040503050406030204" pitchFamily="18" charset="0"/>
+                          </a:rPr>
+                        </m:ctrlPr>
+                      </m:sSubPr>
+                      <m:e>
+                        <m:r>
+                          <a:rPr lang="en-US" sz="1088" b="1" i="1">
+                            <a:latin typeface="Cambria Math" panose="02040503050406030204" pitchFamily="18" charset="0"/>
+                          </a:rPr>
+                          <m:t>𝒙</m:t>
+                        </m:r>
+                      </m:e>
+                      <m:sub>
+                        <m:r>
+                          <a:rPr lang="en-US" sz="1088" b="1" i="1">
+                            <a:latin typeface="Cambria Math" panose="02040503050406030204" pitchFamily="18" charset="0"/>
+                          </a:rPr>
+                          <m:t>𝟒</m:t>
+                        </m:r>
+                        <m:r>
+                          <a:rPr lang="en-US" sz="1088" b="1" i="1">
+                            <a:latin typeface="Cambria Math" panose="02040503050406030204" pitchFamily="18" charset="0"/>
+                          </a:rPr>
+                          <m:t>,</m:t>
+                        </m:r>
+                        <m:r>
+                          <a:rPr lang="en-US" sz="1088" b="1" i="1">
+                            <a:latin typeface="Cambria Math" panose="02040503050406030204" pitchFamily="18" charset="0"/>
+                          </a:rPr>
+                          <m:t>𝒊</m:t>
+                        </m:r>
+                      </m:sub>
+                    </m:sSub>
+                    <m:sSub>
+                      <m:sSubPr>
+                        <m:ctrlPr>
+                          <a:rPr lang="en-US" sz="1088" b="1" i="1">
+                            <a:latin typeface="Cambria Math" panose="02040503050406030204" pitchFamily="18" charset="0"/>
+                          </a:rPr>
+                        </m:ctrlPr>
+                      </m:sSubPr>
+                      <m:e>
+                        <m:r>
+                          <a:rPr lang="en-US" sz="1088" b="1" i="1">
+                            <a:latin typeface="Cambria Math" panose="02040503050406030204" pitchFamily="18" charset="0"/>
+                          </a:rPr>
+                          <m:t>𝜷</m:t>
+                        </m:r>
+                      </m:e>
+                      <m:sub>
+                        <m:r>
+                          <a:rPr lang="en-US" sz="1088" b="1" i="1">
+                            <a:latin typeface="Cambria Math" panose="02040503050406030204" pitchFamily="18" charset="0"/>
+                          </a:rPr>
+                          <m:t>𝟒</m:t>
+                        </m:r>
+                      </m:sub>
+                    </m:sSub>
+                    <m:r>
+                      <a:rPr lang="en-US" sz="1088" b="1" i="1">
+                        <a:latin typeface="Cambria Math" panose="02040503050406030204" pitchFamily="18" charset="0"/>
+                      </a:rPr>
+                      <m:t>+</m:t>
+                    </m:r>
+                    <m:sSub>
+                      <m:sSubPr>
+                        <m:ctrlPr>
+                          <a:rPr lang="en-US" sz="1088" b="1" i="1">
+                            <a:latin typeface="Cambria Math" panose="02040503050406030204" pitchFamily="18" charset="0"/>
+                          </a:rPr>
+                        </m:ctrlPr>
+                      </m:sSubPr>
+                      <m:e>
+                        <m:r>
+                          <a:rPr lang="en-US" sz="1088" b="1" i="1">
+                            <a:latin typeface="Cambria Math" panose="02040503050406030204" pitchFamily="18" charset="0"/>
+                          </a:rPr>
+                          <m:t>𝝐</m:t>
+                        </m:r>
+                      </m:e>
+                      <m:sub>
+                        <m:r>
+                          <a:rPr lang="en-US" sz="1088" b="1" i="1">
+                            <a:latin typeface="Cambria Math" panose="02040503050406030204" pitchFamily="18" charset="0"/>
+                          </a:rPr>
+                          <m:t>𝒊</m:t>
+                        </m:r>
+                      </m:sub>
+                    </m:sSub>
+                  </m:oMath>
+                </a14:m>
+                <a:r>
+                  <a:rPr lang="en-US" sz="1088" b="1" dirty="0"/>
+                  <a:t> ,</a:t>
+                </a:r>
+                <a:r>
+                  <a:rPr lang="en-US" sz="1088" dirty="0"/>
+                  <a:t> </a:t>
+                </a:r>
+                <a:r>
+                  <a:rPr lang="en-US" sz="1088" b="1" dirty="0"/>
+                  <a:t>where </a:t>
+                </a:r>
+                <a14:m>
+                  <m:oMath xmlns:m="http://schemas.openxmlformats.org/officeDocument/2006/math">
+                    <m:sSub>
+                      <m:sSubPr>
+                        <m:ctrlPr>
+                          <a:rPr lang="en-US" sz="1088" b="1" i="1">
+                            <a:latin typeface="Cambria Math" panose="02040503050406030204" pitchFamily="18" charset="0"/>
+                          </a:rPr>
+                        </m:ctrlPr>
+                      </m:sSubPr>
+                      <m:e>
+                        <m:r>
+                          <a:rPr lang="en-US" sz="1088" b="1" i="1">
+                            <a:latin typeface="Cambria Math" panose="02040503050406030204" pitchFamily="18" charset="0"/>
+                          </a:rPr>
+                          <m:t>𝜷</m:t>
+                        </m:r>
+                      </m:e>
+                      <m:sub>
+                        <m:r>
+                          <a:rPr lang="en-US" sz="1088" b="1" i="1">
+                            <a:latin typeface="Cambria Math" panose="02040503050406030204" pitchFamily="18" charset="0"/>
+                          </a:rPr>
+                          <m:t>𝟏</m:t>
+                        </m:r>
+                      </m:sub>
+                    </m:sSub>
+                    <m:r>
+                      <a:rPr lang="en-US" sz="1088" b="1" i="1">
+                        <a:latin typeface="Cambria Math" panose="02040503050406030204" pitchFamily="18" charset="0"/>
+                      </a:rPr>
+                      <m:t>=</m:t>
+                    </m:r>
+                    <m:r>
+                      <a:rPr lang="en-US" sz="1088" b="1" i="1">
+                        <a:latin typeface="Cambria Math" panose="02040503050406030204" pitchFamily="18" charset="0"/>
+                      </a:rPr>
+                      <m:t>𝟏</m:t>
+                    </m:r>
+                  </m:oMath>
+                </a14:m>
+                <a:r>
+                  <a:rPr lang="en-US" sz="1088" b="1" dirty="0"/>
+                  <a:t>, </a:t>
+                </a:r>
+                <a14:m>
+                  <m:oMath xmlns:m="http://schemas.openxmlformats.org/officeDocument/2006/math">
+                    <m:sSub>
+                      <m:sSubPr>
+                        <m:ctrlPr>
+                          <a:rPr lang="en-US" sz="1088" b="1" i="1">
+                            <a:latin typeface="Cambria Math" panose="02040503050406030204" pitchFamily="18" charset="0"/>
+                          </a:rPr>
+                        </m:ctrlPr>
+                      </m:sSubPr>
+                      <m:e>
+                        <m:r>
+                          <a:rPr lang="en-US" sz="1088" b="1" i="1">
+                            <a:latin typeface="Cambria Math" panose="02040503050406030204" pitchFamily="18" charset="0"/>
+                          </a:rPr>
+                          <m:t>𝜷</m:t>
+                        </m:r>
+                      </m:e>
+                      <m:sub>
+                        <m:r>
+                          <a:rPr lang="en-US" sz="1088" b="1" i="1">
+                            <a:latin typeface="Cambria Math" panose="02040503050406030204" pitchFamily="18" charset="0"/>
+                          </a:rPr>
+                          <m:t>𝟐</m:t>
+                        </m:r>
+                      </m:sub>
+                    </m:sSub>
+                  </m:oMath>
+                </a14:m>
+                <a:r>
+                  <a:rPr lang="en-US" sz="1088" b="1" dirty="0"/>
+                  <a:t> = 2, </a:t>
+                </a:r>
+                <a14:m>
+                  <m:oMath xmlns:m="http://schemas.openxmlformats.org/officeDocument/2006/math">
+                    <m:sSub>
+                      <m:sSubPr>
+                        <m:ctrlPr>
+                          <a:rPr lang="en-US" sz="1088" b="1" i="1">
+                            <a:latin typeface="Cambria Math" panose="02040503050406030204" pitchFamily="18" charset="0"/>
+                          </a:rPr>
+                        </m:ctrlPr>
+                      </m:sSubPr>
+                      <m:e>
+                        <m:r>
+                          <a:rPr lang="en-US" sz="1088" b="1" i="1">
+                            <a:latin typeface="Cambria Math" panose="02040503050406030204" pitchFamily="18" charset="0"/>
+                          </a:rPr>
+                          <m:t>𝜷</m:t>
+                        </m:r>
+                      </m:e>
+                      <m:sub>
+                        <m:r>
+                          <a:rPr lang="en-US" sz="1088" b="1" i="1">
+                            <a:latin typeface="Cambria Math" panose="02040503050406030204" pitchFamily="18" charset="0"/>
+                          </a:rPr>
+                          <m:t>𝟑</m:t>
+                        </m:r>
+                      </m:sub>
+                    </m:sSub>
+                  </m:oMath>
+                </a14:m>
+                <a:r>
+                  <a:rPr lang="en-US" sz="1088" b="1" dirty="0"/>
+                  <a:t> = 3, </a:t>
+                </a:r>
+                <a14:m>
+                  <m:oMath xmlns:m="http://schemas.openxmlformats.org/officeDocument/2006/math">
+                    <m:sSub>
+                      <m:sSubPr>
+                        <m:ctrlPr>
+                          <a:rPr lang="en-US" sz="1088" b="1" i="1">
+                            <a:latin typeface="Cambria Math" panose="02040503050406030204" pitchFamily="18" charset="0"/>
+                          </a:rPr>
+                        </m:ctrlPr>
+                      </m:sSubPr>
+                      <m:e>
+                        <m:r>
+                          <a:rPr lang="en-US" sz="1088" b="1" i="1">
+                            <a:latin typeface="Cambria Math" panose="02040503050406030204" pitchFamily="18" charset="0"/>
+                          </a:rPr>
+                          <m:t>𝜷</m:t>
+                        </m:r>
+                      </m:e>
+                      <m:sub>
+                        <m:r>
+                          <a:rPr lang="en-US" sz="1088" b="1" i="1">
+                            <a:latin typeface="Cambria Math" panose="02040503050406030204" pitchFamily="18" charset="0"/>
+                          </a:rPr>
+                          <m:t>𝟒</m:t>
+                        </m:r>
+                      </m:sub>
+                    </m:sSub>
+                  </m:oMath>
+                </a14:m>
+                <a:r>
+                  <a:rPr lang="en-US" sz="1088" b="1" dirty="0"/>
+                  <a:t> = 4 .</a:t>
+                </a:r>
+              </a:p>
+              <a:p>
+                <a:pPr marL="228600" indent="-228600">
+                  <a:lnSpc>
+                    <a:spcPct val="150000"/>
+                  </a:lnSpc>
+                  <a:buFont typeface="+mj-lt"/>
+                  <a:buAutoNum type="arabicPeriod"/>
+                </a:pPr>
+                <a:r>
+                  <a:rPr lang="en-US" sz="1088" dirty="0"/>
+                  <a:t>Remove data from </a:t>
+                </a:r>
+                <a:r>
+                  <a:rPr lang="en-US" sz="1088" i="1" dirty="0"/>
+                  <a:t>only</a:t>
+                </a:r>
+                <a:r>
+                  <a:rPr lang="en-US" sz="1088" dirty="0"/>
+                  <a:t> response </a:t>
+                </a:r>
+                <a:r>
+                  <a:rPr lang="en-US" sz="1088" i="1" dirty="0"/>
+                  <a:t>Y (</a:t>
+                </a:r>
+                <a:r>
+                  <a:rPr lang="en-US" sz="1088" dirty="0"/>
+                  <a:t>MCAR in this simulation example).</a:t>
+                </a:r>
+              </a:p>
+              <a:p>
+                <a:pPr marL="228600" indent="-228600">
+                  <a:lnSpc>
+                    <a:spcPct val="150000"/>
+                  </a:lnSpc>
+                  <a:buFont typeface="+mj-lt"/>
+                  <a:buAutoNum type="arabicPeriod"/>
+                </a:pPr>
+                <a:r>
+                  <a:rPr lang="en-US" sz="1088" dirty="0"/>
+                  <a:t>Impute the data using multiple imputation, measuring the runtime</a:t>
+                </a:r>
+              </a:p>
+              <a:p>
+                <a:pPr marL="228600" indent="-228600">
+                  <a:lnSpc>
+                    <a:spcPct val="150000"/>
+                  </a:lnSpc>
+                  <a:buFont typeface="+mj-lt"/>
+                  <a:buAutoNum type="arabicPeriod"/>
+                </a:pPr>
+                <a:r>
+                  <a:rPr lang="en-US" sz="1088" dirty="0"/>
+                  <a:t>Apply listwise deletion to data, measuring the runtime</a:t>
+                </a:r>
+              </a:p>
+              <a:p>
+                <a:pPr marL="228600" indent="-228600">
+                  <a:lnSpc>
+                    <a:spcPct val="150000"/>
+                  </a:lnSpc>
+                  <a:buFont typeface="+mj-lt"/>
+                  <a:buAutoNum type="arabicPeriod"/>
+                </a:pPr>
+                <a:r>
+                  <a:rPr lang="en-US" sz="1088" dirty="0"/>
+                  <a:t>Repeat 1-4 for lots of iterations (</a:t>
+                </a:r>
+                <a:r>
+                  <a:rPr lang="en-US" sz="1088" i="1" dirty="0"/>
+                  <a:t>n = 1000</a:t>
+                </a:r>
+                <a:r>
+                  <a:rPr lang="en-US" sz="1088" dirty="0"/>
+                  <a:t>)</a:t>
+                </a:r>
+              </a:p>
+              <a:p>
+                <a:pPr marL="228600" indent="-228600">
+                  <a:lnSpc>
+                    <a:spcPct val="150000"/>
+                  </a:lnSpc>
+                  <a:buFont typeface="+mj-lt"/>
+                  <a:buAutoNum type="arabicPeriod"/>
+                </a:pPr>
+                <a:r>
+                  <a:rPr lang="en-US" sz="1088" dirty="0"/>
+                  <a:t>Compare the average runtime &amp; pooled performance measures for multiple imputation and listwise deletion.</a:t>
+                </a:r>
+              </a:p>
+              <a:p>
+                <a:pPr>
+                  <a:lnSpc>
+                    <a:spcPct val="150000"/>
+                  </a:lnSpc>
+                </a:pPr>
+                <a:r>
+                  <a:rPr lang="en-US" sz="1400" b="1" u="sng" dirty="0">
+                    <a:solidFill>
+                      <a:schemeClr val="accent2"/>
+                    </a:solidFill>
+                  </a:rPr>
+                  <a:t>RESULTS:</a:t>
+                </a:r>
+              </a:p>
+            </p:txBody>
+          </p:sp>
+        </mc:Choice>
+        <mc:Fallback>
+          <p:sp>
+            <p:nvSpPr>
+              <p:cNvPr id="866" name="TextBox 865">
+                <a:extLst>
+                  <a:ext uri="{FF2B5EF4-FFF2-40B4-BE49-F238E27FC236}">
+                    <a16:creationId xmlns:a16="http://schemas.microsoft.com/office/drawing/2014/main" id="{C7D4E343-7ECF-5508-C316-F7FAA70EE3B2}"/>
+                  </a:ext>
+                </a:extLst>
+              </p:cNvPr>
+              <p:cNvSpPr txBox="1">
+                <a:spLocks noRot="1" noChangeAspect="1" noMove="1" noResize="1" noEditPoints="1" noAdjustHandles="1" noChangeArrowheads="1" noChangeShapeType="1" noTextEdit="1"/>
+              </p:cNvSpPr>
+              <p:nvPr/>
+            </p:nvSpPr>
+            <p:spPr>
+              <a:xfrm>
+                <a:off x="22770814" y="3683071"/>
+                <a:ext cx="9708673" cy="2546851"/>
+              </a:xfrm>
+              <a:prstGeom prst="rect">
+                <a:avLst/>
+              </a:prstGeom>
+              <a:blipFill>
+                <a:blip r:embed="rId10"/>
+                <a:stretch>
+                  <a:fillRect l="-131" b="-1980"/>
+                </a:stretch>
+              </a:blipFill>
+            </p:spPr>
+            <p:txBody>
+              <a:bodyPr/>
+              <a:lstStyle/>
+              <a:p>
+                <a:r>
+                  <a:rPr lang="en-US">
+                    <a:noFill/>
+                  </a:rPr>
+                  <a:t> </a:t>
+                </a:r>
+              </a:p>
+            </p:txBody>
+          </p:sp>
+        </mc:Fallback>
+      </mc:AlternateContent>
+      <p:pic>
+        <p:nvPicPr>
+          <p:cNvPr id="867" name="Picture 866" descr="Table&#10;&#10;Description automatically generated">
+            <a:extLst>
+              <a:ext uri="{FF2B5EF4-FFF2-40B4-BE49-F238E27FC236}">
+                <a16:creationId xmlns:a16="http://schemas.microsoft.com/office/drawing/2014/main" id="{0FE89693-49DA-98C1-1D30-55FE44F58A7D}"/>
+              </a:ext>
+            </a:extLst>
+          </p:cNvPr>
+          <p:cNvPicPr>
+            <a:picLocks noChangeAspect="1"/>
+          </p:cNvPicPr>
+          <p:nvPr/>
+        </p:nvPicPr>
+        <p:blipFill>
+          <a:blip r:embed="rId11"/>
+          <a:stretch>
+            <a:fillRect/>
+          </a:stretch>
+        </p:blipFill>
+        <p:spPr>
+          <a:xfrm>
+            <a:off x="29517976" y="4511091"/>
+            <a:ext cx="2770725" cy="1148012"/>
+          </a:xfrm>
+          <a:prstGeom prst="rect">
+            <a:avLst/>
+          </a:prstGeom>
+        </p:spPr>
+      </p:pic>
+      <p:sp>
+        <p:nvSpPr>
+          <p:cNvPr id="868" name="TextBox 867">
+            <a:extLst>
+              <a:ext uri="{FF2B5EF4-FFF2-40B4-BE49-F238E27FC236}">
+                <a16:creationId xmlns:a16="http://schemas.microsoft.com/office/drawing/2014/main" id="{9A3F0316-1FB1-716B-2FCC-B7CB21516AF9}"/>
+              </a:ext>
+            </a:extLst>
+          </p:cNvPr>
+          <p:cNvSpPr txBox="1"/>
+          <p:nvPr/>
+        </p:nvSpPr>
+        <p:spPr>
+          <a:xfrm>
+            <a:off x="22721329" y="8365694"/>
+            <a:ext cx="4758610" cy="369332"/>
+          </a:xfrm>
+          <a:prstGeom prst="rect">
+            <a:avLst/>
+          </a:prstGeom>
+          <a:noFill/>
+        </p:spPr>
+        <p:txBody>
+          <a:bodyPr wrap="none" rtlCol="0">
+            <a:spAutoFit/>
+          </a:bodyPr>
+          <a:lstStyle/>
+          <a:p>
+            <a:r>
+              <a:rPr lang="en-US" b="1" dirty="0">
+                <a:solidFill>
+                  <a:schemeClr val="accent2">
+                    <a:lumMod val="75000"/>
+                  </a:schemeClr>
+                </a:solidFill>
+              </a:rPr>
+              <a:t>Case 2: Missing Data independent of response </a:t>
+            </a:r>
+            <a:r>
+              <a:rPr lang="en-US" b="1" i="1" dirty="0">
+                <a:solidFill>
+                  <a:schemeClr val="accent2">
+                    <a:lumMod val="75000"/>
+                  </a:schemeClr>
+                </a:solidFill>
+              </a:rPr>
+              <a:t>Y</a:t>
+            </a:r>
+            <a:endParaRPr lang="en-US" b="1" dirty="0">
+              <a:solidFill>
+                <a:schemeClr val="accent2">
+                  <a:lumMod val="75000"/>
+                </a:schemeClr>
+              </a:solidFill>
+            </a:endParaRPr>
+          </a:p>
+        </p:txBody>
+      </p:sp>
+      <p:sp>
+        <p:nvSpPr>
+          <p:cNvPr id="870" name="TextBox 869">
+            <a:extLst>
+              <a:ext uri="{FF2B5EF4-FFF2-40B4-BE49-F238E27FC236}">
+                <a16:creationId xmlns:a16="http://schemas.microsoft.com/office/drawing/2014/main" id="{791C5C84-1590-A464-C6F4-D80BDB60A6DB}"/>
+              </a:ext>
+            </a:extLst>
+          </p:cNvPr>
+          <p:cNvSpPr txBox="1"/>
+          <p:nvPr/>
+        </p:nvSpPr>
+        <p:spPr>
+          <a:xfrm>
+            <a:off x="22859282" y="12743886"/>
+            <a:ext cx="7746095" cy="369332"/>
+          </a:xfrm>
+          <a:prstGeom prst="rect">
+            <a:avLst/>
+          </a:prstGeom>
+          <a:noFill/>
+        </p:spPr>
+        <p:txBody>
+          <a:bodyPr wrap="none" rtlCol="0">
+            <a:spAutoFit/>
+          </a:bodyPr>
+          <a:lstStyle/>
+          <a:p>
+            <a:r>
+              <a:rPr lang="en-US" b="1" dirty="0">
+                <a:solidFill>
+                  <a:schemeClr val="accent2">
+                    <a:lumMod val="75000"/>
+                  </a:schemeClr>
+                </a:solidFill>
+              </a:rPr>
+              <a:t>Case 3: Logistic regression model &amp; probability to be missing depends </a:t>
+            </a:r>
+            <a:r>
+              <a:rPr lang="en-US" b="1" i="1" dirty="0">
+                <a:solidFill>
+                  <a:schemeClr val="accent2">
+                    <a:lumMod val="75000"/>
+                  </a:schemeClr>
+                </a:solidFill>
+              </a:rPr>
+              <a:t>only</a:t>
+            </a:r>
+            <a:r>
+              <a:rPr lang="en-US" b="1" dirty="0">
+                <a:solidFill>
+                  <a:schemeClr val="accent2">
+                    <a:lumMod val="75000"/>
+                  </a:schemeClr>
+                </a:solidFill>
+              </a:rPr>
+              <a:t> on </a:t>
+            </a:r>
+            <a:r>
+              <a:rPr lang="en-US" b="1" i="1" dirty="0">
+                <a:solidFill>
+                  <a:schemeClr val="accent2">
+                    <a:lumMod val="75000"/>
+                  </a:schemeClr>
+                </a:solidFill>
+              </a:rPr>
+              <a:t>Y</a:t>
+            </a:r>
+            <a:endParaRPr lang="en-US" b="1" dirty="0">
+              <a:solidFill>
+                <a:schemeClr val="accent2">
+                  <a:lumMod val="75000"/>
+                </a:schemeClr>
+              </a:solidFill>
+            </a:endParaRPr>
+          </a:p>
+        </p:txBody>
+      </p:sp>
+      <mc:AlternateContent xmlns:mc="http://schemas.openxmlformats.org/markup-compatibility/2006">
+        <mc:Choice xmlns:a14="http://schemas.microsoft.com/office/drawing/2010/main" Requires="a14">
+          <p:sp>
+            <p:nvSpPr>
+              <p:cNvPr id="871" name="TextBox 870">
+                <a:extLst>
+                  <a:ext uri="{FF2B5EF4-FFF2-40B4-BE49-F238E27FC236}">
+                    <a16:creationId xmlns:a16="http://schemas.microsoft.com/office/drawing/2014/main" id="{21000F19-35B8-51DE-CD31-CA67B689E6B7}"/>
+                  </a:ext>
+                </a:extLst>
+              </p:cNvPr>
+              <p:cNvSpPr txBox="1"/>
+              <p:nvPr/>
+            </p:nvSpPr>
+            <p:spPr>
+              <a:xfrm>
+                <a:off x="22770814" y="13180759"/>
+                <a:ext cx="9988577" cy="971548"/>
+              </a:xfrm>
+              <a:prstGeom prst="rect">
+                <a:avLst/>
+              </a:prstGeom>
+              <a:noFill/>
+            </p:spPr>
+            <p:txBody>
+              <a:bodyPr wrap="square">
+                <a:spAutoFit/>
+              </a:bodyPr>
+              <a:lstStyle/>
+              <a:p>
+                <a:pPr>
+                  <a:lnSpc>
+                    <a:spcPct val="150000"/>
+                  </a:lnSpc>
+                </a:pPr>
+                <a:r>
+                  <a:rPr lang="en-US" sz="1400" b="1" u="sng" dirty="0">
+                    <a:solidFill>
+                      <a:schemeClr val="accent2"/>
+                    </a:solidFill>
+                  </a:rPr>
+                  <a:t>HYPOTHESIS:</a:t>
+                </a:r>
+                <a:r>
+                  <a:rPr lang="en-US" sz="1125" b="1" dirty="0"/>
+                  <a:t> </a:t>
+                </a:r>
+                <a:r>
+                  <a:rPr lang="en-US" sz="1125" b="1" i="1" dirty="0"/>
+                  <a:t>If </a:t>
+                </a:r>
+                <a:r>
+                  <a:rPr lang="en-US" sz="1125" b="1" dirty="0"/>
+                  <a:t>missingness confined to predictors </a:t>
+                </a:r>
+                <a:r>
+                  <a:rPr lang="en-US" sz="1125" b="1" i="1" dirty="0"/>
+                  <a:t>X</a:t>
+                </a:r>
+                <a:r>
+                  <a:rPr lang="en-US" sz="1125" b="1" dirty="0"/>
+                  <a:t> and depends only on </a:t>
+                </a:r>
+                <a:r>
+                  <a:rPr lang="en-US" sz="1125" b="1" i="1" dirty="0"/>
+                  <a:t>Y </a:t>
+                </a:r>
+                <a:r>
+                  <a:rPr lang="en-US" sz="1125" b="1" dirty="0"/>
+                  <a:t>for a logistic regression model, listwise deletion regression coefficients are unbiased.</a:t>
+                </a:r>
+              </a:p>
+              <a:p>
+                <a:pPr>
+                  <a:lnSpc>
+                    <a:spcPct val="150000"/>
+                  </a:lnSpc>
+                </a:pPr>
+                <a:r>
+                  <a:rPr lang="en-US" sz="1400" b="1" u="sng">
+                    <a:solidFill>
+                      <a:schemeClr val="accent2"/>
+                    </a:solidFill>
+                  </a:rPr>
+                  <a:t>METHODS</a:t>
+                </a:r>
+                <a:r>
+                  <a:rPr lang="en-US" sz="1125" b="1">
+                    <a:solidFill>
+                      <a:schemeClr val="accent2"/>
+                    </a:solidFill>
+                  </a:rPr>
+                  <a:t>:</a:t>
+                </a:r>
+                <a:r>
+                  <a:rPr lang="en-US" sz="1125" b="1" dirty="0">
+                    <a:solidFill>
+                      <a:schemeClr val="accent2"/>
+                    </a:solidFill>
+                  </a:rPr>
+                  <a:t> </a:t>
+                </a:r>
+                <a:r>
+                  <a:rPr lang="en-US" sz="1125" b="1"/>
+                  <a:t>Determining </a:t>
+                </a:r>
+                <a14:m>
+                  <m:oMath xmlns:m="http://schemas.openxmlformats.org/officeDocument/2006/math">
+                    <m:sSub>
+                      <m:sSubPr>
+                        <m:ctrlPr>
+                          <a:rPr lang="en-US" sz="1125" b="1" i="1">
+                            <a:latin typeface="Cambria Math" panose="02040503050406030204" pitchFamily="18" charset="0"/>
+                          </a:rPr>
+                        </m:ctrlPr>
+                      </m:sSubPr>
+                      <m:e>
+                        <m:r>
+                          <a:rPr lang="en-US" sz="1125" b="1" i="1">
+                            <a:latin typeface="Cambria Math" panose="02040503050406030204" pitchFamily="18" charset="0"/>
+                          </a:rPr>
+                          <m:t>𝜷</m:t>
+                        </m:r>
+                      </m:e>
+                      <m:sub>
+                        <m:r>
+                          <a:rPr lang="en-US" sz="1125" b="1" i="1">
+                            <a:latin typeface="Cambria Math" panose="02040503050406030204" pitchFamily="18" charset="0"/>
+                          </a:rPr>
+                          <m:t>𝟏</m:t>
+                        </m:r>
+                      </m:sub>
+                    </m:sSub>
+                    <m:r>
+                      <a:rPr lang="en-US" sz="1125" b="1" i="1">
+                        <a:latin typeface="Cambria Math" panose="02040503050406030204" pitchFamily="18" charset="0"/>
+                      </a:rPr>
+                      <m:t>=</m:t>
+                    </m:r>
+                    <m:r>
+                      <a:rPr lang="en-US" sz="1125" b="1" i="1">
+                        <a:latin typeface="Cambria Math" panose="02040503050406030204" pitchFamily="18" charset="0"/>
+                      </a:rPr>
+                      <m:t>𝟏</m:t>
+                    </m:r>
+                  </m:oMath>
+                </a14:m>
+                <a:r>
+                  <a:rPr lang="en-US" sz="1125" b="1" dirty="0"/>
+                  <a:t>, </a:t>
+                </a:r>
+                <a14:m>
+                  <m:oMath xmlns:m="http://schemas.openxmlformats.org/officeDocument/2006/math">
+                    <m:sSub>
+                      <m:sSubPr>
+                        <m:ctrlPr>
+                          <a:rPr lang="en-US" sz="1125" b="1" i="1">
+                            <a:latin typeface="Cambria Math" panose="02040503050406030204" pitchFamily="18" charset="0"/>
+                          </a:rPr>
+                        </m:ctrlPr>
+                      </m:sSubPr>
+                      <m:e>
+                        <m:r>
+                          <a:rPr lang="en-US" sz="1125" b="1" i="1">
+                            <a:latin typeface="Cambria Math" panose="02040503050406030204" pitchFamily="18" charset="0"/>
+                          </a:rPr>
+                          <m:t>𝜷</m:t>
+                        </m:r>
+                      </m:e>
+                      <m:sub>
+                        <m:r>
+                          <a:rPr lang="en-US" sz="1125" b="1" i="1">
+                            <a:latin typeface="Cambria Math" panose="02040503050406030204" pitchFamily="18" charset="0"/>
+                          </a:rPr>
+                          <m:t>𝟐</m:t>
+                        </m:r>
+                      </m:sub>
+                    </m:sSub>
+                  </m:oMath>
+                </a14:m>
+                <a:r>
+                  <a:rPr lang="en-US" sz="1125" b="1" dirty="0"/>
+                  <a:t> = 2  </a:t>
+                </a:r>
+                <a:r>
+                  <a:rPr lang="en-US" sz="1125" dirty="0"/>
+                  <a:t>in logistic regression model. MNAR missingness where </a:t>
+                </a:r>
+                <a:r>
+                  <a:rPr lang="en-US" sz="1125" i="1" dirty="0"/>
+                  <a:t>Y = 0 </a:t>
+                </a:r>
+                <a:r>
+                  <a:rPr lang="en-US" sz="1125" dirty="0"/>
+                  <a:t>observations have greater missingness probability for predictors than </a:t>
+                </a:r>
+                <a:r>
+                  <a:rPr lang="en-US" sz="1125" i="1" dirty="0"/>
+                  <a:t>Y = 1 </a:t>
+                </a:r>
+                <a:r>
+                  <a:rPr lang="en-US" sz="1125" dirty="0"/>
+                  <a:t>cases</a:t>
+                </a:r>
+              </a:p>
+            </p:txBody>
+          </p:sp>
+        </mc:Choice>
+        <mc:Fallback>
+          <p:sp>
+            <p:nvSpPr>
+              <p:cNvPr id="871" name="TextBox 870">
+                <a:extLst>
+                  <a:ext uri="{FF2B5EF4-FFF2-40B4-BE49-F238E27FC236}">
+                    <a16:creationId xmlns:a16="http://schemas.microsoft.com/office/drawing/2014/main" id="{21000F19-35B8-51DE-CD31-CA67B689E6B7}"/>
+                  </a:ext>
+                </a:extLst>
+              </p:cNvPr>
+              <p:cNvSpPr txBox="1">
+                <a:spLocks noRot="1" noChangeAspect="1" noMove="1" noResize="1" noEditPoints="1" noAdjustHandles="1" noChangeArrowheads="1" noChangeShapeType="1" noTextEdit="1"/>
+              </p:cNvSpPr>
+              <p:nvPr/>
+            </p:nvSpPr>
+            <p:spPr>
+              <a:xfrm>
+                <a:off x="22770814" y="13180759"/>
+                <a:ext cx="9988577" cy="971548"/>
+              </a:xfrm>
+              <a:prstGeom prst="rect">
+                <a:avLst/>
+              </a:prstGeom>
+              <a:blipFill>
+                <a:blip r:embed="rId12"/>
+                <a:stretch>
+                  <a:fillRect l="-127" b="-3846"/>
+                </a:stretch>
+              </a:blipFill>
+            </p:spPr>
+            <p:txBody>
+              <a:bodyPr/>
+              <a:lstStyle/>
+              <a:p>
+                <a:r>
+                  <a:rPr lang="en-US">
+                    <a:noFill/>
+                  </a:rPr>
+                  <a:t> </a:t>
+                </a:r>
+              </a:p>
+            </p:txBody>
+          </p:sp>
+        </mc:Fallback>
+      </mc:AlternateContent>
+      <p:pic>
+        <p:nvPicPr>
+          <p:cNvPr id="875" name="Picture 874" descr="Graphical user interface, text, application, email&#10;&#10;Description automatically generated">
+            <a:extLst>
+              <a:ext uri="{FF2B5EF4-FFF2-40B4-BE49-F238E27FC236}">
+                <a16:creationId xmlns:a16="http://schemas.microsoft.com/office/drawing/2014/main" id="{2274BA73-27F7-8FAF-5352-B5B1C9F3E6E0}"/>
+              </a:ext>
+            </a:extLst>
+          </p:cNvPr>
+          <p:cNvPicPr>
+            <a:picLocks noChangeAspect="1"/>
+          </p:cNvPicPr>
+          <p:nvPr/>
+        </p:nvPicPr>
+        <p:blipFill>
+          <a:blip r:embed="rId13"/>
+          <a:stretch>
+            <a:fillRect/>
+          </a:stretch>
+        </p:blipFill>
+        <p:spPr>
+          <a:xfrm>
+            <a:off x="26470582" y="7489782"/>
+            <a:ext cx="1892300" cy="736600"/>
+          </a:xfrm>
+          <a:prstGeom prst="rect">
+            <a:avLst/>
+          </a:prstGeom>
+        </p:spPr>
+      </p:pic>
+      <p:pic>
+        <p:nvPicPr>
+          <p:cNvPr id="877" name="Picture 876" descr="Table&#10;&#10;Description automatically generated">
+            <a:extLst>
+              <a:ext uri="{FF2B5EF4-FFF2-40B4-BE49-F238E27FC236}">
+                <a16:creationId xmlns:a16="http://schemas.microsoft.com/office/drawing/2014/main" id="{19793D02-8A5A-EA1E-90D7-182F01A721F0}"/>
+              </a:ext>
+            </a:extLst>
+          </p:cNvPr>
+          <p:cNvPicPr>
+            <a:picLocks noChangeAspect="1"/>
+          </p:cNvPicPr>
+          <p:nvPr/>
+        </p:nvPicPr>
+        <p:blipFill>
+          <a:blip r:embed="rId14"/>
+          <a:stretch>
+            <a:fillRect/>
+          </a:stretch>
+        </p:blipFill>
+        <p:spPr>
+          <a:xfrm>
+            <a:off x="23050719" y="6702024"/>
+            <a:ext cx="3213415" cy="1046145"/>
+          </a:xfrm>
+          <a:prstGeom prst="rect">
+            <a:avLst/>
+          </a:prstGeom>
+        </p:spPr>
+      </p:pic>
+      <p:sp>
+        <p:nvSpPr>
+          <p:cNvPr id="878" name="TextBox 877">
+            <a:extLst>
+              <a:ext uri="{FF2B5EF4-FFF2-40B4-BE49-F238E27FC236}">
+                <a16:creationId xmlns:a16="http://schemas.microsoft.com/office/drawing/2014/main" id="{6763A3BE-7021-DB76-9B0E-F10346C92647}"/>
+              </a:ext>
+            </a:extLst>
+          </p:cNvPr>
+          <p:cNvSpPr txBox="1"/>
+          <p:nvPr/>
+        </p:nvSpPr>
+        <p:spPr>
+          <a:xfrm>
+            <a:off x="23645893" y="6221278"/>
+            <a:ext cx="1596719" cy="338554"/>
+          </a:xfrm>
+          <a:prstGeom prst="rect">
+            <a:avLst/>
+          </a:prstGeom>
+          <a:noFill/>
+        </p:spPr>
+        <p:txBody>
+          <a:bodyPr wrap="none" rtlCol="0">
+            <a:spAutoFit/>
+          </a:bodyPr>
+          <a:lstStyle/>
+          <a:p>
+            <a:r>
+              <a:rPr lang="en-US" sz="1600" u="sng" dirty="0">
+                <a:solidFill>
+                  <a:schemeClr val="accent2"/>
+                </a:solidFill>
+              </a:rPr>
+              <a:t>Listwise Deletion</a:t>
+            </a:r>
+          </a:p>
+        </p:txBody>
+      </p:sp>
+      <p:pic>
+        <p:nvPicPr>
+          <p:cNvPr id="880" name="Picture 879" descr="Table&#10;&#10;Description automatically generated">
+            <a:extLst>
+              <a:ext uri="{FF2B5EF4-FFF2-40B4-BE49-F238E27FC236}">
+                <a16:creationId xmlns:a16="http://schemas.microsoft.com/office/drawing/2014/main" id="{C8807349-BCE2-1BE3-D2A5-601D38721901}"/>
+              </a:ext>
+            </a:extLst>
+          </p:cNvPr>
+          <p:cNvPicPr>
+            <a:picLocks noChangeAspect="1"/>
+          </p:cNvPicPr>
+          <p:nvPr/>
+        </p:nvPicPr>
+        <p:blipFill>
+          <a:blip r:embed="rId15"/>
+          <a:stretch>
+            <a:fillRect/>
+          </a:stretch>
+        </p:blipFill>
+        <p:spPr>
+          <a:xfrm>
+            <a:off x="28569331" y="6709411"/>
+            <a:ext cx="3477049" cy="1037344"/>
+          </a:xfrm>
+          <a:prstGeom prst="rect">
+            <a:avLst/>
+          </a:prstGeom>
+        </p:spPr>
+      </p:pic>
+      <p:sp>
+        <p:nvSpPr>
+          <p:cNvPr id="881" name="TextBox 880">
+            <a:extLst>
+              <a:ext uri="{FF2B5EF4-FFF2-40B4-BE49-F238E27FC236}">
+                <a16:creationId xmlns:a16="http://schemas.microsoft.com/office/drawing/2014/main" id="{7DF7A709-3FE6-C688-A059-79B505CB9076}"/>
+              </a:ext>
+            </a:extLst>
+          </p:cNvPr>
+          <p:cNvSpPr txBox="1"/>
+          <p:nvPr/>
+        </p:nvSpPr>
+        <p:spPr>
+          <a:xfrm>
+            <a:off x="29380683" y="6193066"/>
+            <a:ext cx="1855380" cy="338554"/>
+          </a:xfrm>
+          <a:prstGeom prst="rect">
+            <a:avLst/>
+          </a:prstGeom>
+          <a:noFill/>
+        </p:spPr>
+        <p:txBody>
+          <a:bodyPr wrap="none" rtlCol="0">
+            <a:spAutoFit/>
+          </a:bodyPr>
+          <a:lstStyle/>
+          <a:p>
+            <a:r>
+              <a:rPr lang="en-US" sz="1600" u="sng" dirty="0">
+                <a:solidFill>
+                  <a:schemeClr val="accent2"/>
+                </a:solidFill>
+              </a:rPr>
+              <a:t>Multiple Imputation</a:t>
+            </a:r>
+          </a:p>
+        </p:txBody>
+      </p:sp>
+      <mc:AlternateContent xmlns:mc="http://schemas.openxmlformats.org/markup-compatibility/2006">
+        <mc:Choice xmlns:a14="http://schemas.microsoft.com/office/drawing/2010/main" Requires="a14">
+          <p:sp>
+            <p:nvSpPr>
+              <p:cNvPr id="883" name="TextBox 882">
+                <a:extLst>
+                  <a:ext uri="{FF2B5EF4-FFF2-40B4-BE49-F238E27FC236}">
+                    <a16:creationId xmlns:a16="http://schemas.microsoft.com/office/drawing/2014/main" id="{038FC468-B98D-44F6-34F4-B1BF8C294B6C}"/>
+                  </a:ext>
+                </a:extLst>
+              </p:cNvPr>
+              <p:cNvSpPr txBox="1"/>
+              <p:nvPr/>
+            </p:nvSpPr>
+            <p:spPr>
+              <a:xfrm>
+                <a:off x="22859282" y="8810480"/>
+                <a:ext cx="6467779" cy="1688347"/>
+              </a:xfrm>
+              <a:prstGeom prst="rect">
+                <a:avLst/>
+              </a:prstGeom>
+              <a:noFill/>
+            </p:spPr>
+            <p:txBody>
+              <a:bodyPr wrap="square" rtlCol="0">
+                <a:spAutoFit/>
+              </a:bodyPr>
+              <a:lstStyle/>
+              <a:p>
+                <a:pPr>
+                  <a:lnSpc>
+                    <a:spcPct val="150000"/>
+                  </a:lnSpc>
+                </a:pPr>
+                <a:r>
+                  <a:rPr lang="en-US" sz="1400" b="1" u="sng" dirty="0">
+                    <a:solidFill>
+                      <a:schemeClr val="accent2"/>
+                    </a:solidFill>
+                  </a:rPr>
+                  <a:t>HYPOTHESIS</a:t>
+                </a:r>
+                <a:r>
+                  <a:rPr lang="en-US" sz="1400" b="1" dirty="0">
+                    <a:solidFill>
+                      <a:schemeClr val="accent2"/>
+                    </a:solidFill>
+                  </a:rPr>
+                  <a:t>:</a:t>
+                </a:r>
+                <a:r>
+                  <a:rPr lang="en-US" sz="1400" b="1" dirty="0"/>
+                  <a:t> If missingness isn’t dependent on </a:t>
+                </a:r>
+                <a:r>
+                  <a:rPr lang="en-US" sz="1400" b="1" i="1" dirty="0"/>
+                  <a:t>Y</a:t>
+                </a:r>
+                <a:r>
+                  <a:rPr lang="en-US" sz="1400" b="1" dirty="0"/>
+                  <a:t>, regression coefficients are free of bias.</a:t>
+                </a:r>
+              </a:p>
+              <a:p>
+                <a:pPr>
+                  <a:lnSpc>
+                    <a:spcPct val="150000"/>
+                  </a:lnSpc>
+                </a:pPr>
+                <a:r>
+                  <a:rPr lang="en-US" sz="1400" b="1" u="sng" dirty="0">
+                    <a:solidFill>
+                      <a:schemeClr val="accent2"/>
+                    </a:solidFill>
+                  </a:rPr>
+                  <a:t>METHODS:</a:t>
+                </a:r>
+                <a:endParaRPr lang="en-US" sz="1400" b="1" dirty="0"/>
+              </a:p>
+              <a:p>
+                <a:pPr marL="285750" indent="-285750">
+                  <a:lnSpc>
+                    <a:spcPct val="150000"/>
+                  </a:lnSpc>
+                  <a:buFont typeface="Arial" panose="020B0604020202020204" pitchFamily="34" charset="0"/>
+                  <a:buChar char="•"/>
+                </a:pPr>
+                <a:r>
+                  <a:rPr lang="en-US" sz="1400" dirty="0"/>
+                  <a:t>Replicating Case 1 Methods but in step (2), </a:t>
+                </a:r>
+                <a:r>
+                  <a:rPr lang="en-US" sz="1400" b="1" dirty="0"/>
+                  <a:t>create missingness in </a:t>
+                </a:r>
+                <a14:m>
+                  <m:oMath xmlns:m="http://schemas.openxmlformats.org/officeDocument/2006/math">
+                    <m:sSub>
+                      <m:sSubPr>
+                        <m:ctrlPr>
+                          <a:rPr lang="en-US" sz="1400" b="1" i="1">
+                            <a:latin typeface="Cambria Math" panose="02040503050406030204" pitchFamily="18" charset="0"/>
+                          </a:rPr>
+                        </m:ctrlPr>
+                      </m:sSubPr>
+                      <m:e>
+                        <m:r>
+                          <a:rPr lang="en-US" sz="1400" b="1" i="1" smtClean="0">
+                            <a:latin typeface="Cambria Math" panose="02040503050406030204" pitchFamily="18" charset="0"/>
+                          </a:rPr>
+                          <m:t>𝑿</m:t>
+                        </m:r>
+                      </m:e>
+                      <m:sub>
+                        <m:r>
+                          <a:rPr lang="en-US" sz="1400" b="1" i="1">
+                            <a:latin typeface="Cambria Math" panose="02040503050406030204" pitchFamily="18" charset="0"/>
+                          </a:rPr>
+                          <m:t>𝟏</m:t>
+                        </m:r>
+                        <m:r>
+                          <a:rPr lang="en-US" sz="1400" b="1" i="1">
+                            <a:latin typeface="Cambria Math" panose="02040503050406030204" pitchFamily="18" charset="0"/>
+                          </a:rPr>
+                          <m:t>,</m:t>
+                        </m:r>
+                      </m:sub>
+                    </m:sSub>
+                    <m:r>
+                      <a:rPr lang="en-US" sz="1400" b="1" i="1" smtClean="0">
+                        <a:latin typeface="Cambria Math" panose="02040503050406030204" pitchFamily="18" charset="0"/>
+                      </a:rPr>
+                      <m:t>, </m:t>
+                    </m:r>
+                    <m:sSub>
+                      <m:sSubPr>
+                        <m:ctrlPr>
+                          <a:rPr lang="en-US" sz="1400" b="1" i="1" smtClean="0">
+                            <a:latin typeface="Cambria Math" panose="02040503050406030204" pitchFamily="18" charset="0"/>
+                          </a:rPr>
+                        </m:ctrlPr>
+                      </m:sSubPr>
+                      <m:e>
+                        <m:r>
+                          <a:rPr lang="en-US" sz="1400" b="1" i="1" smtClean="0">
+                            <a:latin typeface="Cambria Math" panose="02040503050406030204" pitchFamily="18" charset="0"/>
+                          </a:rPr>
+                          <m:t>𝑿</m:t>
+                        </m:r>
+                      </m:e>
+                      <m:sub>
+                        <m:r>
+                          <a:rPr lang="en-US" sz="1400" b="1" i="1" smtClean="0">
+                            <a:latin typeface="Cambria Math" panose="02040503050406030204" pitchFamily="18" charset="0"/>
+                          </a:rPr>
+                          <m:t>𝟑</m:t>
+                        </m:r>
+                      </m:sub>
+                    </m:sSub>
+                    <m:r>
+                      <a:rPr lang="en-US" sz="1400" b="1" i="1" smtClean="0">
+                        <a:latin typeface="Cambria Math" panose="02040503050406030204" pitchFamily="18" charset="0"/>
+                      </a:rPr>
+                      <m:t>, </m:t>
+                    </m:r>
+                    <m:sSub>
+                      <m:sSubPr>
+                        <m:ctrlPr>
+                          <a:rPr lang="en-US" sz="1400" b="1" i="1" smtClean="0">
+                            <a:latin typeface="Cambria Math" panose="02040503050406030204" pitchFamily="18" charset="0"/>
+                          </a:rPr>
+                        </m:ctrlPr>
+                      </m:sSubPr>
+                      <m:e>
+                        <m:r>
+                          <a:rPr lang="en-US" sz="1400" b="1" i="1" smtClean="0">
+                            <a:latin typeface="Cambria Math" panose="02040503050406030204" pitchFamily="18" charset="0"/>
+                          </a:rPr>
+                          <m:t>𝑿</m:t>
+                        </m:r>
+                      </m:e>
+                      <m:sub>
+                        <m:r>
+                          <a:rPr lang="en-US" sz="1400" b="1" i="1" smtClean="0">
+                            <a:latin typeface="Cambria Math" panose="02040503050406030204" pitchFamily="18" charset="0"/>
+                          </a:rPr>
+                          <m:t>𝟒</m:t>
+                        </m:r>
+                      </m:sub>
+                    </m:sSub>
+                  </m:oMath>
+                </a14:m>
+                <a:r>
+                  <a:rPr lang="en-US" sz="1400" b="1" i="1" dirty="0"/>
+                  <a:t> </a:t>
+                </a:r>
+                <a:r>
+                  <a:rPr lang="en-US" sz="1400" b="1" dirty="0"/>
+                  <a:t>dependent </a:t>
+                </a:r>
+                <a:r>
+                  <a:rPr lang="en-US" sz="1400" b="1" i="1" dirty="0"/>
+                  <a:t>on </a:t>
+                </a:r>
+                <a14:m>
+                  <m:oMath xmlns:m="http://schemas.openxmlformats.org/officeDocument/2006/math">
+                    <m:sSub>
+                      <m:sSubPr>
+                        <m:ctrlPr>
+                          <a:rPr lang="en-US" sz="1400" b="1" i="1">
+                            <a:latin typeface="Cambria Math" panose="02040503050406030204" pitchFamily="18" charset="0"/>
+                          </a:rPr>
+                        </m:ctrlPr>
+                      </m:sSubPr>
+                      <m:e>
+                        <m:r>
+                          <a:rPr lang="en-US" sz="1400" b="1" i="1">
+                            <a:latin typeface="Cambria Math" panose="02040503050406030204" pitchFamily="18" charset="0"/>
+                          </a:rPr>
+                          <m:t>𝑿</m:t>
+                        </m:r>
+                      </m:e>
+                      <m:sub>
+                        <m:r>
+                          <a:rPr lang="en-US" sz="1400" b="1" i="1" smtClean="0">
+                            <a:latin typeface="Cambria Math" panose="02040503050406030204" pitchFamily="18" charset="0"/>
+                          </a:rPr>
+                          <m:t>𝟐</m:t>
+                        </m:r>
+                      </m:sub>
+                    </m:sSub>
+                  </m:oMath>
+                </a14:m>
+                <a:r>
+                  <a:rPr lang="en-US" sz="1400" b="1" i="1" dirty="0"/>
+                  <a:t> </a:t>
+                </a:r>
+                <a:r>
+                  <a:rPr lang="en-US" sz="1400" b="1" dirty="0"/>
+                  <a:t>value</a:t>
+                </a:r>
+              </a:p>
+            </p:txBody>
+          </p:sp>
+        </mc:Choice>
+        <mc:Fallback>
+          <p:sp>
+            <p:nvSpPr>
+              <p:cNvPr id="883" name="TextBox 882">
+                <a:extLst>
+                  <a:ext uri="{FF2B5EF4-FFF2-40B4-BE49-F238E27FC236}">
+                    <a16:creationId xmlns:a16="http://schemas.microsoft.com/office/drawing/2014/main" id="{038FC468-B98D-44F6-34F4-B1BF8C294B6C}"/>
+                  </a:ext>
+                </a:extLst>
+              </p:cNvPr>
+              <p:cNvSpPr txBox="1">
+                <a:spLocks noRot="1" noChangeAspect="1" noMove="1" noResize="1" noEditPoints="1" noAdjustHandles="1" noChangeArrowheads="1" noChangeShapeType="1" noTextEdit="1"/>
+              </p:cNvSpPr>
+              <p:nvPr/>
+            </p:nvSpPr>
+            <p:spPr>
+              <a:xfrm>
+                <a:off x="22859282" y="8810480"/>
+                <a:ext cx="6467779" cy="1688347"/>
+              </a:xfrm>
+              <a:prstGeom prst="rect">
+                <a:avLst/>
+              </a:prstGeom>
+              <a:blipFill>
+                <a:blip r:embed="rId16"/>
+                <a:stretch>
+                  <a:fillRect l="-392" b="-2985"/>
+                </a:stretch>
+              </a:blipFill>
+            </p:spPr>
+            <p:txBody>
+              <a:bodyPr/>
+              <a:lstStyle/>
+              <a:p>
+                <a:r>
+                  <a:rPr lang="en-US">
+                    <a:noFill/>
+                  </a:rPr>
+                  <a:t> </a:t>
+                </a:r>
+              </a:p>
+            </p:txBody>
+          </p:sp>
+        </mc:Fallback>
+      </mc:AlternateContent>
+      <p:grpSp>
+        <p:nvGrpSpPr>
+          <p:cNvPr id="886" name="Group 885">
+            <a:extLst>
+              <a:ext uri="{FF2B5EF4-FFF2-40B4-BE49-F238E27FC236}">
+                <a16:creationId xmlns:a16="http://schemas.microsoft.com/office/drawing/2014/main" id="{ABF1A6BE-58CB-E9CB-BACA-DE6A62E81E73}"/>
+              </a:ext>
+            </a:extLst>
+          </p:cNvPr>
+          <p:cNvGrpSpPr/>
+          <p:nvPr/>
+        </p:nvGrpSpPr>
+        <p:grpSpPr>
+          <a:xfrm>
+            <a:off x="29417645" y="8924029"/>
+            <a:ext cx="2865243" cy="1283150"/>
+            <a:chOff x="17773348" y="35135411"/>
+            <a:chExt cx="4882079" cy="1606985"/>
+          </a:xfrm>
+        </p:grpSpPr>
+        <p:pic>
+          <p:nvPicPr>
+            <p:cNvPr id="887" name="Picture 886" descr="Table, Excel&#10;&#10;Description automatically generated">
+              <a:extLst>
+                <a:ext uri="{FF2B5EF4-FFF2-40B4-BE49-F238E27FC236}">
+                  <a16:creationId xmlns:a16="http://schemas.microsoft.com/office/drawing/2014/main" id="{AC213293-7F59-B87B-0D8A-2FDD8FED854D}"/>
+                </a:ext>
+              </a:extLst>
+            </p:cNvPr>
+            <p:cNvPicPr>
+              <a:picLocks noChangeAspect="1"/>
+            </p:cNvPicPr>
+            <p:nvPr/>
+          </p:nvPicPr>
+          <p:blipFill rotWithShape="1">
+            <a:blip r:embed="rId17"/>
+            <a:srcRect l="149" t="42257" r="-1" b="33373"/>
+            <a:stretch/>
+          </p:blipFill>
+          <p:spPr>
+            <a:xfrm>
+              <a:off x="17773348" y="35407434"/>
+              <a:ext cx="4882079" cy="1334962"/>
+            </a:xfrm>
+            <a:prstGeom prst="rect">
+              <a:avLst/>
+            </a:prstGeom>
+          </p:spPr>
+        </p:pic>
+        <p:pic>
+          <p:nvPicPr>
+            <p:cNvPr id="888" name="Picture 887">
+              <a:extLst>
+                <a:ext uri="{FF2B5EF4-FFF2-40B4-BE49-F238E27FC236}">
+                  <a16:creationId xmlns:a16="http://schemas.microsoft.com/office/drawing/2014/main" id="{EC7D255C-6564-32DE-B05D-93CB6DD27BD3}"/>
+                </a:ext>
+              </a:extLst>
+            </p:cNvPr>
+            <p:cNvPicPr>
+              <a:picLocks noChangeAspect="1"/>
+            </p:cNvPicPr>
+            <p:nvPr/>
+          </p:nvPicPr>
+          <p:blipFill>
+            <a:blip r:embed="rId18"/>
+            <a:stretch>
+              <a:fillRect/>
+            </a:stretch>
+          </p:blipFill>
+          <p:spPr>
+            <a:xfrm>
+              <a:off x="17773348" y="35135411"/>
+              <a:ext cx="4882079" cy="272023"/>
+            </a:xfrm>
+            <a:prstGeom prst="rect">
+              <a:avLst/>
+            </a:prstGeom>
+          </p:spPr>
+        </p:pic>
+      </p:grpSp>
+      <p:sp>
+        <p:nvSpPr>
+          <p:cNvPr id="889" name="TextBox 888">
+            <a:extLst>
+              <a:ext uri="{FF2B5EF4-FFF2-40B4-BE49-F238E27FC236}">
+                <a16:creationId xmlns:a16="http://schemas.microsoft.com/office/drawing/2014/main" id="{9FB99765-383D-2A13-C580-CF8CEE7DB045}"/>
+              </a:ext>
+            </a:extLst>
+          </p:cNvPr>
+          <p:cNvSpPr txBox="1"/>
+          <p:nvPr/>
+        </p:nvSpPr>
+        <p:spPr>
+          <a:xfrm>
+            <a:off x="23870367" y="10418972"/>
+            <a:ext cx="1596719" cy="338554"/>
+          </a:xfrm>
+          <a:prstGeom prst="rect">
+            <a:avLst/>
+          </a:prstGeom>
+          <a:noFill/>
+        </p:spPr>
+        <p:txBody>
+          <a:bodyPr wrap="none" rtlCol="0">
+            <a:spAutoFit/>
+          </a:bodyPr>
+          <a:lstStyle/>
+          <a:p>
+            <a:r>
+              <a:rPr lang="en-US" sz="1600" u="sng" dirty="0">
+                <a:solidFill>
+                  <a:schemeClr val="accent2"/>
+                </a:solidFill>
+              </a:rPr>
+              <a:t>Listwise Deletion</a:t>
+            </a:r>
+          </a:p>
+        </p:txBody>
+      </p:sp>
+      <p:sp>
+        <p:nvSpPr>
+          <p:cNvPr id="890" name="TextBox 889">
+            <a:extLst>
+              <a:ext uri="{FF2B5EF4-FFF2-40B4-BE49-F238E27FC236}">
+                <a16:creationId xmlns:a16="http://schemas.microsoft.com/office/drawing/2014/main" id="{33956F3D-38A6-FED2-F3C6-99FB6C523359}"/>
+              </a:ext>
+            </a:extLst>
+          </p:cNvPr>
+          <p:cNvSpPr txBox="1"/>
+          <p:nvPr/>
+        </p:nvSpPr>
+        <p:spPr>
+          <a:xfrm>
+            <a:off x="28994886" y="10447324"/>
+            <a:ext cx="1855380" cy="338554"/>
+          </a:xfrm>
+          <a:prstGeom prst="rect">
+            <a:avLst/>
+          </a:prstGeom>
+          <a:noFill/>
+        </p:spPr>
+        <p:txBody>
+          <a:bodyPr wrap="none" rtlCol="0">
+            <a:spAutoFit/>
+          </a:bodyPr>
+          <a:lstStyle/>
+          <a:p>
+            <a:r>
+              <a:rPr lang="en-US" sz="1600" u="sng" dirty="0">
+                <a:solidFill>
+                  <a:schemeClr val="accent2"/>
+                </a:solidFill>
+              </a:rPr>
+              <a:t>Multiple Imputation</a:t>
+            </a:r>
+          </a:p>
+        </p:txBody>
+      </p:sp>
+      <p:pic>
+        <p:nvPicPr>
+          <p:cNvPr id="892" name="Picture 891" descr="Table&#10;&#10;Description automatically generated">
+            <a:extLst>
+              <a:ext uri="{FF2B5EF4-FFF2-40B4-BE49-F238E27FC236}">
+                <a16:creationId xmlns:a16="http://schemas.microsoft.com/office/drawing/2014/main" id="{409C6659-0EB1-8BDD-A28C-2C2525FEF22C}"/>
+              </a:ext>
+            </a:extLst>
+          </p:cNvPr>
+          <p:cNvPicPr>
+            <a:picLocks noChangeAspect="1"/>
+          </p:cNvPicPr>
+          <p:nvPr/>
+        </p:nvPicPr>
+        <p:blipFill>
+          <a:blip r:embed="rId19"/>
+          <a:stretch>
+            <a:fillRect/>
+          </a:stretch>
+        </p:blipFill>
+        <p:spPr>
+          <a:xfrm>
+            <a:off x="22756469" y="10861493"/>
+            <a:ext cx="4468116" cy="939800"/>
+          </a:xfrm>
+          <a:prstGeom prst="rect">
+            <a:avLst/>
+          </a:prstGeom>
+        </p:spPr>
+      </p:pic>
+      <p:pic>
+        <p:nvPicPr>
+          <p:cNvPr id="896" name="Picture 895" descr="Table&#10;&#10;Description automatically generated">
+            <a:extLst>
+              <a:ext uri="{FF2B5EF4-FFF2-40B4-BE49-F238E27FC236}">
+                <a16:creationId xmlns:a16="http://schemas.microsoft.com/office/drawing/2014/main" id="{08D7D0B1-E044-BADB-D74D-FF7D323B04A6}"/>
+              </a:ext>
+            </a:extLst>
+          </p:cNvPr>
+          <p:cNvPicPr>
+            <a:picLocks noChangeAspect="1"/>
+          </p:cNvPicPr>
+          <p:nvPr/>
+        </p:nvPicPr>
+        <p:blipFill>
+          <a:blip r:embed="rId20"/>
+          <a:stretch>
+            <a:fillRect/>
+          </a:stretch>
+        </p:blipFill>
+        <p:spPr>
+          <a:xfrm>
+            <a:off x="27848716" y="10880543"/>
+            <a:ext cx="4508500" cy="901700"/>
+          </a:xfrm>
+          <a:prstGeom prst="rect">
+            <a:avLst/>
+          </a:prstGeom>
+        </p:spPr>
+      </p:pic>
+      <p:pic>
+        <p:nvPicPr>
+          <p:cNvPr id="898" name="Picture 897" descr="Table&#10;&#10;Description automatically generated">
+            <a:extLst>
+              <a:ext uri="{FF2B5EF4-FFF2-40B4-BE49-F238E27FC236}">
+                <a16:creationId xmlns:a16="http://schemas.microsoft.com/office/drawing/2014/main" id="{C45121D3-8BB8-12B1-038E-51D9332152E9}"/>
+              </a:ext>
+            </a:extLst>
+          </p:cNvPr>
+          <p:cNvPicPr>
+            <a:picLocks noChangeAspect="1"/>
+          </p:cNvPicPr>
+          <p:nvPr/>
+        </p:nvPicPr>
+        <p:blipFill>
+          <a:blip r:embed="rId21"/>
+          <a:stretch>
+            <a:fillRect/>
+          </a:stretch>
+        </p:blipFill>
+        <p:spPr>
+          <a:xfrm>
+            <a:off x="26470582" y="12004383"/>
+            <a:ext cx="2364916" cy="561330"/>
+          </a:xfrm>
+          <a:prstGeom prst="rect">
+            <a:avLst/>
+          </a:prstGeom>
+        </p:spPr>
+      </p:pic>
     </p:spTree>
     <p:extLst>
       <p:ext uri="{BB962C8B-B14F-4D97-AF65-F5344CB8AC3E}">

</xml_diff>